<commit_message>
fix: synchronize users in each view
</commit_message>
<xml_diff>
--- a/Montaine_Valentin_ByeByeCar.pptx
+++ b/Montaine_Valentin_ByeByeCar.pptx
@@ -17540,36 +17540,6 @@
           <a:chExt cx="0" cy="0"/>
         </a:xfrm>
       </p:grpSpPr>
-      <p:pic>
-        <p:nvPicPr>
-          <p:cNvPr id="3" name="Image 2">
-            <a:extLst>
-              <a:ext uri="{FF2B5EF4-FFF2-40B4-BE49-F238E27FC236}">
-                <a16:creationId xmlns:a16="http://schemas.microsoft.com/office/drawing/2014/main" id="{0A28BC6A-3CC6-4125-958D-D5F3717FDE73}"/>
-              </a:ext>
-            </a:extLst>
-          </p:cNvPr>
-          <p:cNvPicPr>
-            <a:picLocks noChangeAspect="1"/>
-          </p:cNvPicPr>
-          <p:nvPr/>
-        </p:nvPicPr>
-        <p:blipFill>
-          <a:blip r:embed="rId2"/>
-          <a:stretch>
-            <a:fillRect/>
-          </a:stretch>
-        </p:blipFill>
-        <p:spPr>
-          <a:xfrm>
-            <a:off x="393690" y="1799927"/>
-            <a:ext cx="3840813" cy="937341"/>
-          </a:xfrm>
-          <a:prstGeom prst="rect">
-            <a:avLst/>
-          </a:prstGeom>
-        </p:spPr>
-      </p:pic>
       <p:sp>
         <p:nvSpPr>
           <p:cNvPr id="4" name="Text Box 1">
@@ -18022,10 +17992,40 @@
       </p:sp>
       <p:pic>
         <p:nvPicPr>
-          <p:cNvPr id="5" name="Image 4">
+          <p:cNvPr id="2" name="Image 1">
             <a:extLst>
               <a:ext uri="{FF2B5EF4-FFF2-40B4-BE49-F238E27FC236}">
-                <a16:creationId xmlns:a16="http://schemas.microsoft.com/office/drawing/2014/main" id="{43F46561-6352-46DB-BAD0-4A1108F19177}"/>
+                <a16:creationId xmlns:a16="http://schemas.microsoft.com/office/drawing/2014/main" id="{11D5AF30-BB96-401E-8CEF-661C0236B0B6}"/>
+              </a:ext>
+            </a:extLst>
+          </p:cNvPr>
+          <p:cNvPicPr>
+            <a:picLocks noChangeAspect="1"/>
+          </p:cNvPicPr>
+          <p:nvPr/>
+        </p:nvPicPr>
+        <p:blipFill>
+          <a:blip r:embed="rId2"/>
+          <a:stretch>
+            <a:fillRect/>
+          </a:stretch>
+        </p:blipFill>
+        <p:spPr>
+          <a:xfrm>
+            <a:off x="1081311" y="1799927"/>
+            <a:ext cx="3360711" cy="419136"/>
+          </a:xfrm>
+          <a:prstGeom prst="rect">
+            <a:avLst/>
+          </a:prstGeom>
+        </p:spPr>
+      </p:pic>
+      <p:pic>
+        <p:nvPicPr>
+          <p:cNvPr id="7" name="Image 6">
+            <a:extLst>
+              <a:ext uri="{FF2B5EF4-FFF2-40B4-BE49-F238E27FC236}">
+                <a16:creationId xmlns:a16="http://schemas.microsoft.com/office/drawing/2014/main" id="{09E6AF76-B09A-4036-97C0-B21FBB8763EE}"/>
               </a:ext>
             </a:extLst>
           </p:cNvPr>
@@ -18042,8 +18042,8 @@
         </p:blipFill>
         <p:spPr>
           <a:xfrm>
-            <a:off x="4393679" y="1738961"/>
-            <a:ext cx="3795089" cy="1059272"/>
+            <a:off x="1225327" y="2375991"/>
+            <a:ext cx="4054191" cy="762066"/>
           </a:xfrm>
           <a:prstGeom prst="rect">
             <a:avLst/>
@@ -18052,10 +18052,10 @@
       </p:pic>
       <p:pic>
         <p:nvPicPr>
-          <p:cNvPr id="6" name="Image 5">
+          <p:cNvPr id="8" name="Image 7">
             <a:extLst>
               <a:ext uri="{FF2B5EF4-FFF2-40B4-BE49-F238E27FC236}">
-                <a16:creationId xmlns:a16="http://schemas.microsoft.com/office/drawing/2014/main" id="{E6FEE39D-C0A6-40DB-8DD2-25C9C9D20C13}"/>
+                <a16:creationId xmlns:a16="http://schemas.microsoft.com/office/drawing/2014/main" id="{4D3852A0-CB15-41BA-B8EC-4ED264711B6C}"/>
               </a:ext>
             </a:extLst>
           </p:cNvPr>
@@ -18072,8 +18072,38 @@
         </p:blipFill>
         <p:spPr>
           <a:xfrm>
-            <a:off x="3745607" y="2996082"/>
-            <a:ext cx="3063505" cy="746825"/>
+            <a:off x="1873399" y="3326428"/>
+            <a:ext cx="3505504" cy="1828958"/>
+          </a:xfrm>
+          <a:prstGeom prst="rect">
+            <a:avLst/>
+          </a:prstGeom>
+        </p:spPr>
+      </p:pic>
+      <p:pic>
+        <p:nvPicPr>
+          <p:cNvPr id="9" name="Image 8">
+            <a:extLst>
+              <a:ext uri="{FF2B5EF4-FFF2-40B4-BE49-F238E27FC236}">
+                <a16:creationId xmlns:a16="http://schemas.microsoft.com/office/drawing/2014/main" id="{D5DEDFC3-B524-42DF-BB2E-3A932B584E36}"/>
+              </a:ext>
+            </a:extLst>
+          </p:cNvPr>
+          <p:cNvPicPr>
+            <a:picLocks noChangeAspect="1"/>
+          </p:cNvPicPr>
+          <p:nvPr/>
+        </p:nvPicPr>
+        <p:blipFill>
+          <a:blip r:embed="rId5"/>
+          <a:stretch>
+            <a:fillRect/>
+          </a:stretch>
+        </p:blipFill>
+        <p:spPr>
+          <a:xfrm>
+            <a:off x="5833839" y="2200716"/>
+            <a:ext cx="5105842" cy="937341"/>
           </a:xfrm>
           <a:prstGeom prst="rect">
             <a:avLst/>

</xml_diff>

<commit_message>
update: doc and last (?) updates
</commit_message>
<xml_diff>
--- a/Montaine_Valentin_ByeByeCar.pptx
+++ b/Montaine_Valentin_ByeByeCar.pptx
@@ -6,14 +6,16 @@
     <p:sldMasterId id="2147483649" r:id="rId2"/>
   </p:sldMasterIdLst>
   <p:notesMasterIdLst>
-    <p:notesMasterId r:id="rId8"/>
+    <p:notesMasterId r:id="rId10"/>
   </p:notesMasterIdLst>
   <p:sldIdLst>
     <p:sldId id="256" r:id="rId3"/>
     <p:sldId id="261" r:id="rId4"/>
     <p:sldId id="279" r:id="rId5"/>
-    <p:sldId id="278" r:id="rId6"/>
-    <p:sldId id="277" r:id="rId7"/>
+    <p:sldId id="280" r:id="rId6"/>
+    <p:sldId id="278" r:id="rId7"/>
+    <p:sldId id="281" r:id="rId8"/>
+    <p:sldId id="277" r:id="rId9"/>
   </p:sldIdLst>
   <p:sldSz cx="11523663" cy="6480175"/>
   <p:notesSz cx="6858000" cy="9144000"/>
@@ -17540,12 +17542,433 @@
           <a:chExt cx="0" cy="0"/>
         </a:xfrm>
       </p:grpSpPr>
+      <p:graphicFrame>
+        <p:nvGraphicFramePr>
+          <p:cNvPr id="3" name="Tableau 2">
+            <a:extLst>
+              <a:ext uri="{FF2B5EF4-FFF2-40B4-BE49-F238E27FC236}">
+                <a16:creationId xmlns:a16="http://schemas.microsoft.com/office/drawing/2014/main" id="{6B3213F2-2D2F-4E7C-A292-C3FD125DEECE}"/>
+              </a:ext>
+            </a:extLst>
+          </p:cNvPr>
+          <p:cNvGraphicFramePr>
+            <a:graphicFrameLocks noGrp="1"/>
+          </p:cNvGraphicFramePr>
+          <p:nvPr>
+            <p:extLst>
+              <p:ext uri="{D42A27DB-BD31-4B8C-83A1-F6EECF244321}">
+                <p14:modId xmlns:p14="http://schemas.microsoft.com/office/powerpoint/2010/main" val="1558527249"/>
+              </p:ext>
+            </p:extLst>
+          </p:nvPr>
+        </p:nvGraphicFramePr>
+        <p:xfrm>
+          <a:off x="483241" y="1493011"/>
+          <a:ext cx="10557179" cy="4033520"/>
+        </p:xfrm>
+        <a:graphic>
+          <a:graphicData uri="http://schemas.openxmlformats.org/drawingml/2006/table">
+            <a:tbl>
+              <a:tblPr firstRow="1" bandRow="1">
+                <a:tableStyleId>{21E4AEA4-8DFA-4A89-87EB-49C32662AFE0}</a:tableStyleId>
+              </a:tblPr>
+              <a:tblGrid>
+                <a:gridCol w="3622791">
+                  <a:extLst>
+                    <a:ext uri="{9D8B030D-6E8A-4147-A177-3AD203B41FA5}">
+                      <a16:colId xmlns:a16="http://schemas.microsoft.com/office/drawing/2014/main" val="1048375150"/>
+                    </a:ext>
+                  </a:extLst>
+                </a:gridCol>
+                <a:gridCol w="6934388">
+                  <a:extLst>
+                    <a:ext uri="{9D8B030D-6E8A-4147-A177-3AD203B41FA5}">
+                      <a16:colId xmlns:a16="http://schemas.microsoft.com/office/drawing/2014/main" val="2969970233"/>
+                    </a:ext>
+                  </a:extLst>
+                </a:gridCol>
+              </a:tblGrid>
+              <a:tr h="370840">
+                <a:tc>
+                  <a:txBody>
+                    <a:bodyPr/>
+                    <a:lstStyle/>
+                    <a:p>
+                      <a:r>
+                        <a:rPr lang="fr-CH" dirty="0"/>
+                        <a:t>Technologie</a:t>
+                      </a:r>
+                    </a:p>
+                  </a:txBody>
+                  <a:tcPr/>
+                </a:tc>
+                <a:tc>
+                  <a:txBody>
+                    <a:bodyPr/>
+                    <a:lstStyle/>
+                    <a:p>
+                      <a:r>
+                        <a:rPr lang="fr-CH" dirty="0"/>
+                        <a:t>Illustration</a:t>
+                      </a:r>
+                    </a:p>
+                  </a:txBody>
+                  <a:tcPr/>
+                </a:tc>
+                <a:extLst>
+                  <a:ext uri="{0D108BD9-81ED-4DB2-BD59-A6C34878D82A}">
+                    <a16:rowId xmlns:a16="http://schemas.microsoft.com/office/drawing/2014/main" val="1941489533"/>
+                  </a:ext>
+                </a:extLst>
+              </a:tr>
+              <a:tr h="370840">
+                <a:tc>
+                  <a:txBody>
+                    <a:bodyPr/>
+                    <a:lstStyle/>
+                    <a:p>
+                      <a:pPr marL="0" marR="0" lvl="0" indent="0" algn="l" defTabSz="914400" rtl="0" eaLnBrk="1" fontAlgn="auto" latinLnBrk="0" hangingPunct="1">
+                        <a:lnSpc>
+                          <a:spcPct val="100000"/>
+                        </a:lnSpc>
+                        <a:spcBef>
+                          <a:spcPts val="0"/>
+                        </a:spcBef>
+                        <a:spcAft>
+                          <a:spcPts val="0"/>
+                        </a:spcAft>
+                        <a:buClrTx/>
+                        <a:buSzTx/>
+                        <a:buFontTx/>
+                        <a:buNone/>
+                        <a:tabLst/>
+                        <a:defRPr/>
+                      </a:pPr>
+                      <a:endParaRPr lang="fr-CH" dirty="0"/>
+                    </a:p>
+                    <a:p>
+                      <a:pPr marL="0" marR="0" lvl="0" indent="0" algn="l" defTabSz="914400" rtl="0" eaLnBrk="1" fontAlgn="auto" latinLnBrk="0" hangingPunct="1">
+                        <a:lnSpc>
+                          <a:spcPct val="100000"/>
+                        </a:lnSpc>
+                        <a:spcBef>
+                          <a:spcPts val="0"/>
+                        </a:spcBef>
+                        <a:spcAft>
+                          <a:spcPts val="0"/>
+                        </a:spcAft>
+                        <a:buClrTx/>
+                        <a:buSzTx/>
+                        <a:buFontTx/>
+                        <a:buNone/>
+                        <a:tabLst/>
+                        <a:defRPr/>
+                      </a:pPr>
+                      <a:endParaRPr lang="fr-CH" dirty="0"/>
+                    </a:p>
+                    <a:p>
+                      <a:pPr marL="0" marR="0" lvl="0" indent="0" algn="l" defTabSz="914400" rtl="0" eaLnBrk="1" fontAlgn="auto" latinLnBrk="0" hangingPunct="1">
+                        <a:lnSpc>
+                          <a:spcPct val="100000"/>
+                        </a:lnSpc>
+                        <a:spcBef>
+                          <a:spcPts val="0"/>
+                        </a:spcBef>
+                        <a:spcAft>
+                          <a:spcPts val="0"/>
+                        </a:spcAft>
+                        <a:buClrTx/>
+                        <a:buSzTx/>
+                        <a:buFontTx/>
+                        <a:buNone/>
+                        <a:tabLst/>
+                        <a:defRPr/>
+                      </a:pPr>
+                      <a:r>
+                        <a:rPr lang="fr-CH" dirty="0"/>
+                        <a:t>@</a:t>
+                      </a:r>
+                      <a:r>
+                        <a:rPr lang="fr-CH" dirty="0" err="1"/>
+                        <a:t>TransactionAttribute</a:t>
+                      </a:r>
+                      <a:endParaRPr lang="fr-CH" dirty="0"/>
+                    </a:p>
+                    <a:p>
+                      <a:pPr marL="0" marR="0" lvl="0" indent="0" algn="l" defTabSz="914400" rtl="0" eaLnBrk="1" fontAlgn="auto" latinLnBrk="0" hangingPunct="1">
+                        <a:lnSpc>
+                          <a:spcPct val="100000"/>
+                        </a:lnSpc>
+                        <a:spcBef>
+                          <a:spcPts val="0"/>
+                        </a:spcBef>
+                        <a:spcAft>
+                          <a:spcPts val="0"/>
+                        </a:spcAft>
+                        <a:buClrTx/>
+                        <a:buSzTx/>
+                        <a:buFontTx/>
+                        <a:buNone/>
+                        <a:tabLst/>
+                        <a:defRPr/>
+                      </a:pPr>
+                      <a:endParaRPr lang="fr-CH" dirty="0"/>
+                    </a:p>
+                    <a:p>
+                      <a:pPr marL="0" marR="0" lvl="0" indent="0" algn="l" defTabSz="914400" rtl="0" eaLnBrk="1" fontAlgn="auto" latinLnBrk="0" hangingPunct="1">
+                        <a:lnSpc>
+                          <a:spcPct val="100000"/>
+                        </a:lnSpc>
+                        <a:spcBef>
+                          <a:spcPts val="0"/>
+                        </a:spcBef>
+                        <a:spcAft>
+                          <a:spcPts val="0"/>
+                        </a:spcAft>
+                        <a:buClrTx/>
+                        <a:buSzTx/>
+                        <a:buFontTx/>
+                        <a:buNone/>
+                        <a:tabLst/>
+                        <a:defRPr/>
+                      </a:pPr>
+                      <a:endParaRPr lang="fr-CH" dirty="0"/>
+                    </a:p>
+                  </a:txBody>
+                  <a:tcPr anchor="ctr"/>
+                </a:tc>
+                <a:tc>
+                  <a:txBody>
+                    <a:bodyPr/>
+                    <a:lstStyle/>
+                    <a:p>
+                      <a:endParaRPr lang="fr-CH" dirty="0"/>
+                    </a:p>
+                  </a:txBody>
+                  <a:tcPr/>
+                </a:tc>
+                <a:extLst>
+                  <a:ext uri="{0D108BD9-81ED-4DB2-BD59-A6C34878D82A}">
+                    <a16:rowId xmlns:a16="http://schemas.microsoft.com/office/drawing/2014/main" val="647502944"/>
+                  </a:ext>
+                </a:extLst>
+              </a:tr>
+              <a:tr h="370840">
+                <a:tc>
+                  <a:txBody>
+                    <a:bodyPr/>
+                    <a:lstStyle/>
+                    <a:p>
+                      <a:pPr marL="0" marR="0" lvl="0" indent="0" algn="l" defTabSz="914400" rtl="0" eaLnBrk="1" fontAlgn="auto" latinLnBrk="0" hangingPunct="1">
+                        <a:lnSpc>
+                          <a:spcPct val="100000"/>
+                        </a:lnSpc>
+                        <a:spcBef>
+                          <a:spcPts val="0"/>
+                        </a:spcBef>
+                        <a:spcAft>
+                          <a:spcPts val="0"/>
+                        </a:spcAft>
+                        <a:buClrTx/>
+                        <a:buSzTx/>
+                        <a:buFontTx/>
+                        <a:buNone/>
+                        <a:tabLst/>
+                        <a:defRPr/>
+                      </a:pPr>
+                      <a:endParaRPr lang="fr-CH" dirty="0"/>
+                    </a:p>
+                    <a:p>
+                      <a:pPr marL="0" marR="0" lvl="0" indent="0" algn="l" defTabSz="914400" rtl="0" eaLnBrk="1" fontAlgn="auto" latinLnBrk="0" hangingPunct="1">
+                        <a:lnSpc>
+                          <a:spcPct val="100000"/>
+                        </a:lnSpc>
+                        <a:spcBef>
+                          <a:spcPts val="0"/>
+                        </a:spcBef>
+                        <a:spcAft>
+                          <a:spcPts val="0"/>
+                        </a:spcAft>
+                        <a:buClrTx/>
+                        <a:buSzTx/>
+                        <a:buFontTx/>
+                        <a:buNone/>
+                        <a:tabLst/>
+                        <a:defRPr/>
+                      </a:pPr>
+                      <a:r>
+                        <a:rPr lang="fr-CH" dirty="0" err="1"/>
+                        <a:t>Inheritance</a:t>
+                      </a:r>
+                      <a:endParaRPr lang="fr-CH" dirty="0"/>
+                    </a:p>
+                    <a:p>
+                      <a:endParaRPr lang="fr-CH" dirty="0"/>
+                    </a:p>
+                  </a:txBody>
+                  <a:tcPr/>
+                </a:tc>
+                <a:tc>
+                  <a:txBody>
+                    <a:bodyPr/>
+                    <a:lstStyle/>
+                    <a:p>
+                      <a:endParaRPr lang="fr-CH"/>
+                    </a:p>
+                  </a:txBody>
+                  <a:tcPr/>
+                </a:tc>
+                <a:extLst>
+                  <a:ext uri="{0D108BD9-81ED-4DB2-BD59-A6C34878D82A}">
+                    <a16:rowId xmlns:a16="http://schemas.microsoft.com/office/drawing/2014/main" val="2415852597"/>
+                  </a:ext>
+                </a:extLst>
+              </a:tr>
+              <a:tr h="370840">
+                <a:tc>
+                  <a:txBody>
+                    <a:bodyPr/>
+                    <a:lstStyle/>
+                    <a:p>
+                      <a:pPr marL="0" marR="0" lvl="0" indent="0" algn="l" defTabSz="914400" rtl="0" eaLnBrk="1" fontAlgn="auto" latinLnBrk="0" hangingPunct="1">
+                        <a:lnSpc>
+                          <a:spcPct val="100000"/>
+                        </a:lnSpc>
+                        <a:spcBef>
+                          <a:spcPts val="0"/>
+                        </a:spcBef>
+                        <a:spcAft>
+                          <a:spcPts val="0"/>
+                        </a:spcAft>
+                        <a:buClrTx/>
+                        <a:buSzTx/>
+                        <a:buFontTx/>
+                        <a:buNone/>
+                        <a:tabLst/>
+                        <a:defRPr/>
+                      </a:pPr>
+                      <a:endParaRPr lang="fr-CH" dirty="0"/>
+                    </a:p>
+                    <a:p>
+                      <a:pPr marL="0" marR="0" lvl="0" indent="0" algn="l" defTabSz="914400" rtl="0" eaLnBrk="1" fontAlgn="auto" latinLnBrk="0" hangingPunct="1">
+                        <a:lnSpc>
+                          <a:spcPct val="100000"/>
+                        </a:lnSpc>
+                        <a:spcBef>
+                          <a:spcPts val="0"/>
+                        </a:spcBef>
+                        <a:spcAft>
+                          <a:spcPts val="0"/>
+                        </a:spcAft>
+                        <a:buClrTx/>
+                        <a:buSzTx/>
+                        <a:buFontTx/>
+                        <a:buNone/>
+                        <a:tabLst/>
+                        <a:defRPr/>
+                      </a:pPr>
+                      <a:r>
+                        <a:rPr lang="fr-CH" dirty="0" err="1"/>
+                        <a:t>Embedding</a:t>
+                      </a:r>
+                      <a:endParaRPr lang="fr-CH" dirty="0"/>
+                    </a:p>
+                    <a:p>
+                      <a:pPr marL="0" marR="0" lvl="0" indent="0" algn="l" defTabSz="914400" rtl="0" eaLnBrk="1" fontAlgn="auto" latinLnBrk="0" hangingPunct="1">
+                        <a:lnSpc>
+                          <a:spcPct val="100000"/>
+                        </a:lnSpc>
+                        <a:spcBef>
+                          <a:spcPts val="0"/>
+                        </a:spcBef>
+                        <a:spcAft>
+                          <a:spcPts val="0"/>
+                        </a:spcAft>
+                        <a:buClrTx/>
+                        <a:buSzTx/>
+                        <a:buFontTx/>
+                        <a:buNone/>
+                        <a:tabLst/>
+                        <a:defRPr/>
+                      </a:pPr>
+                      <a:endParaRPr lang="fr-CH" dirty="0"/>
+                    </a:p>
+                  </a:txBody>
+                  <a:tcPr/>
+                </a:tc>
+                <a:tc>
+                  <a:txBody>
+                    <a:bodyPr/>
+                    <a:lstStyle/>
+                    <a:p>
+                      <a:endParaRPr lang="fr-CH"/>
+                    </a:p>
+                  </a:txBody>
+                  <a:tcPr/>
+                </a:tc>
+                <a:extLst>
+                  <a:ext uri="{0D108BD9-81ED-4DB2-BD59-A6C34878D82A}">
+                    <a16:rowId xmlns:a16="http://schemas.microsoft.com/office/drawing/2014/main" val="3436118537"/>
+                  </a:ext>
+                </a:extLst>
+              </a:tr>
+              <a:tr h="370840">
+                <a:tc>
+                  <a:txBody>
+                    <a:bodyPr/>
+                    <a:lstStyle/>
+                    <a:p>
+                      <a:pPr marL="0" marR="0" lvl="0" indent="0" algn="l" defTabSz="914400" rtl="0" eaLnBrk="1" fontAlgn="auto" latinLnBrk="0" hangingPunct="1">
+                        <a:lnSpc>
+                          <a:spcPct val="100000"/>
+                        </a:lnSpc>
+                        <a:spcBef>
+                          <a:spcPts val="0"/>
+                        </a:spcBef>
+                        <a:spcAft>
+                          <a:spcPts val="0"/>
+                        </a:spcAft>
+                        <a:buClrTx/>
+                        <a:buSzTx/>
+                        <a:buFontTx/>
+                        <a:buNone/>
+                        <a:tabLst/>
+                        <a:defRPr/>
+                      </a:pPr>
+                      <a:r>
+                        <a:rPr lang="fr-CH" dirty="0"/>
+                        <a:t>Security</a:t>
+                      </a:r>
+                    </a:p>
+                  </a:txBody>
+                  <a:tcPr/>
+                </a:tc>
+                <a:tc>
+                  <a:txBody>
+                    <a:bodyPr/>
+                    <a:lstStyle/>
+                    <a:p>
+                      <a:endParaRPr lang="fr-CH" dirty="0"/>
+                    </a:p>
+                  </a:txBody>
+                  <a:tcPr/>
+                </a:tc>
+                <a:extLst>
+                  <a:ext uri="{0D108BD9-81ED-4DB2-BD59-A6C34878D82A}">
+                    <a16:rowId xmlns:a16="http://schemas.microsoft.com/office/drawing/2014/main" val="1415314562"/>
+                  </a:ext>
+                </a:extLst>
+              </a:tr>
+            </a:tbl>
+          </a:graphicData>
+        </a:graphic>
+      </p:graphicFrame>
       <p:sp>
         <p:nvSpPr>
-          <p:cNvPr id="4" name="Text Box 1">
+          <p:cNvPr id="2" name="Text Box 1">
             <a:extLst>
               <a:ext uri="{FF2B5EF4-FFF2-40B4-BE49-F238E27FC236}">
-                <a16:creationId xmlns:a16="http://schemas.microsoft.com/office/drawing/2014/main" id="{8118B50D-9A44-46FD-9E32-AC4B58280387}"/>
+                <a16:creationId xmlns:a16="http://schemas.microsoft.com/office/drawing/2014/main" id="{6D3AD965-A5AA-401F-BF87-5436E248DCED}"/>
               </a:ext>
             </a:extLst>
           </p:cNvPr>
@@ -17985,6 +18408,1363 @@
                   <a:srgbClr val="000000"/>
                 </a:solidFill>
               </a:rPr>
+              <a:t>Technologies choisies</a:t>
+            </a:r>
+          </a:p>
+        </p:txBody>
+      </p:sp>
+      <p:pic>
+        <p:nvPicPr>
+          <p:cNvPr id="4" name="Image 3">
+            <a:extLst>
+              <a:ext uri="{FF2B5EF4-FFF2-40B4-BE49-F238E27FC236}">
+                <a16:creationId xmlns:a16="http://schemas.microsoft.com/office/drawing/2014/main" id="{DF41698D-D074-4CCD-9F0A-368FFB22931C}"/>
+              </a:ext>
+            </a:extLst>
+          </p:cNvPr>
+          <p:cNvPicPr>
+            <a:picLocks noChangeAspect="1"/>
+          </p:cNvPicPr>
+          <p:nvPr/>
+        </p:nvPicPr>
+        <p:blipFill>
+          <a:blip r:embed="rId2"/>
+          <a:stretch>
+            <a:fillRect/>
+          </a:stretch>
+        </p:blipFill>
+        <p:spPr>
+          <a:xfrm>
+            <a:off x="4177655" y="5271121"/>
+            <a:ext cx="2979678" cy="182896"/>
+          </a:xfrm>
+          <a:prstGeom prst="rect">
+            <a:avLst/>
+          </a:prstGeom>
+        </p:spPr>
+      </p:pic>
+      <p:pic>
+        <p:nvPicPr>
+          <p:cNvPr id="5" name="Image 4">
+            <a:extLst>
+              <a:ext uri="{FF2B5EF4-FFF2-40B4-BE49-F238E27FC236}">
+                <a16:creationId xmlns:a16="http://schemas.microsoft.com/office/drawing/2014/main" id="{1F2173DE-77C2-44DA-9655-182182EAF463}"/>
+              </a:ext>
+            </a:extLst>
+          </p:cNvPr>
+          <p:cNvPicPr>
+            <a:picLocks noChangeAspect="1"/>
+          </p:cNvPicPr>
+          <p:nvPr/>
+        </p:nvPicPr>
+        <p:blipFill>
+          <a:blip r:embed="rId3"/>
+          <a:stretch>
+            <a:fillRect/>
+          </a:stretch>
+        </p:blipFill>
+        <p:spPr>
+          <a:xfrm>
+            <a:off x="4249663" y="4384448"/>
+            <a:ext cx="1783235" cy="586791"/>
+          </a:xfrm>
+          <a:prstGeom prst="rect">
+            <a:avLst/>
+          </a:prstGeom>
+        </p:spPr>
+      </p:pic>
+      <p:pic>
+        <p:nvPicPr>
+          <p:cNvPr id="6" name="Image 5">
+            <a:extLst>
+              <a:ext uri="{FF2B5EF4-FFF2-40B4-BE49-F238E27FC236}">
+                <a16:creationId xmlns:a16="http://schemas.microsoft.com/office/drawing/2014/main" id="{25153320-3B5B-4BDE-999D-E0D47B48FFA2}"/>
+              </a:ext>
+            </a:extLst>
+          </p:cNvPr>
+          <p:cNvPicPr>
+            <a:picLocks noChangeAspect="1"/>
+          </p:cNvPicPr>
+          <p:nvPr/>
+        </p:nvPicPr>
+        <p:blipFill>
+          <a:blip r:embed="rId4"/>
+          <a:stretch>
+            <a:fillRect/>
+          </a:stretch>
+        </p:blipFill>
+        <p:spPr>
+          <a:xfrm>
+            <a:off x="8237453" y="3370071"/>
+            <a:ext cx="2453853" cy="358171"/>
+          </a:xfrm>
+          <a:prstGeom prst="rect">
+            <a:avLst/>
+          </a:prstGeom>
+        </p:spPr>
+      </p:pic>
+      <p:pic>
+        <p:nvPicPr>
+          <p:cNvPr id="7" name="Image 6">
+            <a:extLst>
+              <a:ext uri="{FF2B5EF4-FFF2-40B4-BE49-F238E27FC236}">
+                <a16:creationId xmlns:a16="http://schemas.microsoft.com/office/drawing/2014/main" id="{853F189F-BE11-4263-847F-315BCC3A2661}"/>
+              </a:ext>
+            </a:extLst>
+          </p:cNvPr>
+          <p:cNvPicPr>
+            <a:picLocks noChangeAspect="1"/>
+          </p:cNvPicPr>
+          <p:nvPr/>
+        </p:nvPicPr>
+        <p:blipFill>
+          <a:blip r:embed="rId5"/>
+          <a:stretch>
+            <a:fillRect/>
+          </a:stretch>
+        </p:blipFill>
+        <p:spPr>
+          <a:xfrm>
+            <a:off x="8237453" y="3811952"/>
+            <a:ext cx="2484335" cy="335309"/>
+          </a:xfrm>
+          <a:prstGeom prst="rect">
+            <a:avLst/>
+          </a:prstGeom>
+        </p:spPr>
+      </p:pic>
+      <p:pic>
+        <p:nvPicPr>
+          <p:cNvPr id="8" name="Image 7">
+            <a:extLst>
+              <a:ext uri="{FF2B5EF4-FFF2-40B4-BE49-F238E27FC236}">
+                <a16:creationId xmlns:a16="http://schemas.microsoft.com/office/drawing/2014/main" id="{A47DCD13-32A3-456F-BE2C-83B69171850A}"/>
+              </a:ext>
+            </a:extLst>
+          </p:cNvPr>
+          <p:cNvPicPr>
+            <a:picLocks noChangeAspect="1"/>
+          </p:cNvPicPr>
+          <p:nvPr/>
+        </p:nvPicPr>
+        <p:blipFill>
+          <a:blip r:embed="rId6"/>
+          <a:stretch>
+            <a:fillRect/>
+          </a:stretch>
+        </p:blipFill>
+        <p:spPr>
+          <a:xfrm>
+            <a:off x="4177655" y="3471123"/>
+            <a:ext cx="3977985" cy="358171"/>
+          </a:xfrm>
+          <a:prstGeom prst="rect">
+            <a:avLst/>
+          </a:prstGeom>
+        </p:spPr>
+      </p:pic>
+      <p:pic>
+        <p:nvPicPr>
+          <p:cNvPr id="9" name="Image 8">
+            <a:extLst>
+              <a:ext uri="{FF2B5EF4-FFF2-40B4-BE49-F238E27FC236}">
+                <a16:creationId xmlns:a16="http://schemas.microsoft.com/office/drawing/2014/main" id="{74962165-CBE7-416B-B123-783419DC5FA2}"/>
+              </a:ext>
+            </a:extLst>
+          </p:cNvPr>
+          <p:cNvPicPr>
+            <a:picLocks noChangeAspect="1"/>
+          </p:cNvPicPr>
+          <p:nvPr/>
+        </p:nvPicPr>
+        <p:blipFill rotWithShape="1">
+          <a:blip r:embed="rId7"/>
+          <a:srcRect t="-1" b="93443"/>
+          <a:stretch/>
+        </p:blipFill>
+        <p:spPr>
+          <a:xfrm>
+            <a:off x="4249663" y="1985098"/>
+            <a:ext cx="6492803" cy="218899"/>
+          </a:xfrm>
+          <a:prstGeom prst="rect">
+            <a:avLst/>
+          </a:prstGeom>
+        </p:spPr>
+      </p:pic>
+      <p:pic>
+        <p:nvPicPr>
+          <p:cNvPr id="10" name="Image 9">
+            <a:extLst>
+              <a:ext uri="{FF2B5EF4-FFF2-40B4-BE49-F238E27FC236}">
+                <a16:creationId xmlns:a16="http://schemas.microsoft.com/office/drawing/2014/main" id="{4281D17D-6458-48F4-9D24-CC7A0B49A1FB}"/>
+              </a:ext>
+            </a:extLst>
+          </p:cNvPr>
+          <p:cNvPicPr>
+            <a:picLocks noChangeAspect="1"/>
+          </p:cNvPicPr>
+          <p:nvPr/>
+        </p:nvPicPr>
+        <p:blipFill rotWithShape="1">
+          <a:blip r:embed="rId7"/>
+          <a:srcRect t="41643" b="29930"/>
+          <a:stretch/>
+        </p:blipFill>
+        <p:spPr>
+          <a:xfrm>
+            <a:off x="4249663" y="2241864"/>
+            <a:ext cx="6492803" cy="948862"/>
+          </a:xfrm>
+          <a:prstGeom prst="rect">
+            <a:avLst/>
+          </a:prstGeom>
+        </p:spPr>
+      </p:pic>
+    </p:spTree>
+    <p:extLst>
+      <p:ext uri="{BB962C8B-B14F-4D97-AF65-F5344CB8AC3E}">
+        <p14:creationId xmlns:p14="http://schemas.microsoft.com/office/powerpoint/2010/main" val="2941455977"/>
+      </p:ext>
+    </p:extLst>
+  </p:cSld>
+  <p:clrMapOvr>
+    <a:masterClrMapping/>
+  </p:clrMapOvr>
+  <p:timing>
+    <p:tnLst>
+      <p:par>
+        <p:cTn id="1" dur="indefinite" restart="never" nodeType="tmRoot">
+          <p:childTnLst>
+            <p:seq concurrent="1" nextAc="seek">
+              <p:cTn id="2" dur="indefinite" nodeType="mainSeq">
+                <p:childTnLst>
+                  <p:par>
+                    <p:cTn id="3" fill="hold">
+                      <p:stCondLst>
+                        <p:cond delay="indefinite"/>
+                      </p:stCondLst>
+                      <p:childTnLst>
+                        <p:par>
+                          <p:cTn id="4" fill="hold">
+                            <p:stCondLst>
+                              <p:cond delay="0"/>
+                            </p:stCondLst>
+                            <p:childTnLst>
+                              <p:par>
+                                <p:cTn id="5" presetID="42" presetClass="entr" presetSubtype="0" fill="hold" nodeType="clickEffect">
+                                  <p:stCondLst>
+                                    <p:cond delay="0"/>
+                                  </p:stCondLst>
+                                  <p:childTnLst>
+                                    <p:set>
+                                      <p:cBhvr>
+                                        <p:cTn id="6" dur="1" fill="hold">
+                                          <p:stCondLst>
+                                            <p:cond delay="0"/>
+                                          </p:stCondLst>
+                                        </p:cTn>
+                                        <p:tgtEl>
+                                          <p:spTgt spid="9"/>
+                                        </p:tgtEl>
+                                        <p:attrNameLst>
+                                          <p:attrName>style.visibility</p:attrName>
+                                        </p:attrNameLst>
+                                      </p:cBhvr>
+                                      <p:to>
+                                        <p:strVal val="visible"/>
+                                      </p:to>
+                                    </p:set>
+                                    <p:animEffect transition="in" filter="fade">
+                                      <p:cBhvr>
+                                        <p:cTn id="7" dur="1000"/>
+                                        <p:tgtEl>
+                                          <p:spTgt spid="9"/>
+                                        </p:tgtEl>
+                                      </p:cBhvr>
+                                    </p:animEffect>
+                                    <p:anim calcmode="lin" valueType="num">
+                                      <p:cBhvr>
+                                        <p:cTn id="8" dur="1000" fill="hold"/>
+                                        <p:tgtEl>
+                                          <p:spTgt spid="9"/>
+                                        </p:tgtEl>
+                                        <p:attrNameLst>
+                                          <p:attrName>ppt_x</p:attrName>
+                                        </p:attrNameLst>
+                                      </p:cBhvr>
+                                      <p:tavLst>
+                                        <p:tav tm="0">
+                                          <p:val>
+                                            <p:strVal val="#ppt_x"/>
+                                          </p:val>
+                                        </p:tav>
+                                        <p:tav tm="100000">
+                                          <p:val>
+                                            <p:strVal val="#ppt_x"/>
+                                          </p:val>
+                                        </p:tav>
+                                      </p:tavLst>
+                                    </p:anim>
+                                    <p:anim calcmode="lin" valueType="num">
+                                      <p:cBhvr>
+                                        <p:cTn id="9" dur="1000" fill="hold"/>
+                                        <p:tgtEl>
+                                          <p:spTgt spid="9"/>
+                                        </p:tgtEl>
+                                        <p:attrNameLst>
+                                          <p:attrName>ppt_y</p:attrName>
+                                        </p:attrNameLst>
+                                      </p:cBhvr>
+                                      <p:tavLst>
+                                        <p:tav tm="0">
+                                          <p:val>
+                                            <p:strVal val="#ppt_y+.1"/>
+                                          </p:val>
+                                        </p:tav>
+                                        <p:tav tm="100000">
+                                          <p:val>
+                                            <p:strVal val="#ppt_y"/>
+                                          </p:val>
+                                        </p:tav>
+                                      </p:tavLst>
+                                    </p:anim>
+                                  </p:childTnLst>
+                                </p:cTn>
+                              </p:par>
+                              <p:par>
+                                <p:cTn id="10" presetID="42" presetClass="entr" presetSubtype="0" fill="hold" nodeType="withEffect">
+                                  <p:stCondLst>
+                                    <p:cond delay="0"/>
+                                  </p:stCondLst>
+                                  <p:childTnLst>
+                                    <p:set>
+                                      <p:cBhvr>
+                                        <p:cTn id="11" dur="1" fill="hold">
+                                          <p:stCondLst>
+                                            <p:cond delay="0"/>
+                                          </p:stCondLst>
+                                        </p:cTn>
+                                        <p:tgtEl>
+                                          <p:spTgt spid="10"/>
+                                        </p:tgtEl>
+                                        <p:attrNameLst>
+                                          <p:attrName>style.visibility</p:attrName>
+                                        </p:attrNameLst>
+                                      </p:cBhvr>
+                                      <p:to>
+                                        <p:strVal val="visible"/>
+                                      </p:to>
+                                    </p:set>
+                                    <p:animEffect transition="in" filter="fade">
+                                      <p:cBhvr>
+                                        <p:cTn id="12" dur="1000"/>
+                                        <p:tgtEl>
+                                          <p:spTgt spid="10"/>
+                                        </p:tgtEl>
+                                      </p:cBhvr>
+                                    </p:animEffect>
+                                    <p:anim calcmode="lin" valueType="num">
+                                      <p:cBhvr>
+                                        <p:cTn id="13" dur="1000" fill="hold"/>
+                                        <p:tgtEl>
+                                          <p:spTgt spid="10"/>
+                                        </p:tgtEl>
+                                        <p:attrNameLst>
+                                          <p:attrName>ppt_x</p:attrName>
+                                        </p:attrNameLst>
+                                      </p:cBhvr>
+                                      <p:tavLst>
+                                        <p:tav tm="0">
+                                          <p:val>
+                                            <p:strVal val="#ppt_x"/>
+                                          </p:val>
+                                        </p:tav>
+                                        <p:tav tm="100000">
+                                          <p:val>
+                                            <p:strVal val="#ppt_x"/>
+                                          </p:val>
+                                        </p:tav>
+                                      </p:tavLst>
+                                    </p:anim>
+                                    <p:anim calcmode="lin" valueType="num">
+                                      <p:cBhvr>
+                                        <p:cTn id="14" dur="1000" fill="hold"/>
+                                        <p:tgtEl>
+                                          <p:spTgt spid="10"/>
+                                        </p:tgtEl>
+                                        <p:attrNameLst>
+                                          <p:attrName>ppt_y</p:attrName>
+                                        </p:attrNameLst>
+                                      </p:cBhvr>
+                                      <p:tavLst>
+                                        <p:tav tm="0">
+                                          <p:val>
+                                            <p:strVal val="#ppt_y+.1"/>
+                                          </p:val>
+                                        </p:tav>
+                                        <p:tav tm="100000">
+                                          <p:val>
+                                            <p:strVal val="#ppt_y"/>
+                                          </p:val>
+                                        </p:tav>
+                                      </p:tavLst>
+                                    </p:anim>
+                                  </p:childTnLst>
+                                </p:cTn>
+                              </p:par>
+                            </p:childTnLst>
+                          </p:cTn>
+                        </p:par>
+                      </p:childTnLst>
+                    </p:cTn>
+                  </p:par>
+                  <p:par>
+                    <p:cTn id="15" fill="hold">
+                      <p:stCondLst>
+                        <p:cond delay="indefinite"/>
+                      </p:stCondLst>
+                      <p:childTnLst>
+                        <p:par>
+                          <p:cTn id="16" fill="hold">
+                            <p:stCondLst>
+                              <p:cond delay="0"/>
+                            </p:stCondLst>
+                            <p:childTnLst>
+                              <p:par>
+                                <p:cTn id="17" presetID="42" presetClass="entr" presetSubtype="0" fill="hold" nodeType="clickEffect">
+                                  <p:stCondLst>
+                                    <p:cond delay="0"/>
+                                  </p:stCondLst>
+                                  <p:childTnLst>
+                                    <p:set>
+                                      <p:cBhvr>
+                                        <p:cTn id="18" dur="1" fill="hold">
+                                          <p:stCondLst>
+                                            <p:cond delay="0"/>
+                                          </p:stCondLst>
+                                        </p:cTn>
+                                        <p:tgtEl>
+                                          <p:spTgt spid="8"/>
+                                        </p:tgtEl>
+                                        <p:attrNameLst>
+                                          <p:attrName>style.visibility</p:attrName>
+                                        </p:attrNameLst>
+                                      </p:cBhvr>
+                                      <p:to>
+                                        <p:strVal val="visible"/>
+                                      </p:to>
+                                    </p:set>
+                                    <p:animEffect transition="in" filter="fade">
+                                      <p:cBhvr>
+                                        <p:cTn id="19" dur="1000"/>
+                                        <p:tgtEl>
+                                          <p:spTgt spid="8"/>
+                                        </p:tgtEl>
+                                      </p:cBhvr>
+                                    </p:animEffect>
+                                    <p:anim calcmode="lin" valueType="num">
+                                      <p:cBhvr>
+                                        <p:cTn id="20" dur="1000" fill="hold"/>
+                                        <p:tgtEl>
+                                          <p:spTgt spid="8"/>
+                                        </p:tgtEl>
+                                        <p:attrNameLst>
+                                          <p:attrName>ppt_x</p:attrName>
+                                        </p:attrNameLst>
+                                      </p:cBhvr>
+                                      <p:tavLst>
+                                        <p:tav tm="0">
+                                          <p:val>
+                                            <p:strVal val="#ppt_x"/>
+                                          </p:val>
+                                        </p:tav>
+                                        <p:tav tm="100000">
+                                          <p:val>
+                                            <p:strVal val="#ppt_x"/>
+                                          </p:val>
+                                        </p:tav>
+                                      </p:tavLst>
+                                    </p:anim>
+                                    <p:anim calcmode="lin" valueType="num">
+                                      <p:cBhvr>
+                                        <p:cTn id="21" dur="1000" fill="hold"/>
+                                        <p:tgtEl>
+                                          <p:spTgt spid="8"/>
+                                        </p:tgtEl>
+                                        <p:attrNameLst>
+                                          <p:attrName>ppt_y</p:attrName>
+                                        </p:attrNameLst>
+                                      </p:cBhvr>
+                                      <p:tavLst>
+                                        <p:tav tm="0">
+                                          <p:val>
+                                            <p:strVal val="#ppt_y+.1"/>
+                                          </p:val>
+                                        </p:tav>
+                                        <p:tav tm="100000">
+                                          <p:val>
+                                            <p:strVal val="#ppt_y"/>
+                                          </p:val>
+                                        </p:tav>
+                                      </p:tavLst>
+                                    </p:anim>
+                                  </p:childTnLst>
+                                </p:cTn>
+                              </p:par>
+                              <p:par>
+                                <p:cTn id="22" presetID="42" presetClass="entr" presetSubtype="0" fill="hold" nodeType="withEffect">
+                                  <p:stCondLst>
+                                    <p:cond delay="0"/>
+                                  </p:stCondLst>
+                                  <p:childTnLst>
+                                    <p:set>
+                                      <p:cBhvr>
+                                        <p:cTn id="23" dur="1" fill="hold">
+                                          <p:stCondLst>
+                                            <p:cond delay="0"/>
+                                          </p:stCondLst>
+                                        </p:cTn>
+                                        <p:tgtEl>
+                                          <p:spTgt spid="6"/>
+                                        </p:tgtEl>
+                                        <p:attrNameLst>
+                                          <p:attrName>style.visibility</p:attrName>
+                                        </p:attrNameLst>
+                                      </p:cBhvr>
+                                      <p:to>
+                                        <p:strVal val="visible"/>
+                                      </p:to>
+                                    </p:set>
+                                    <p:animEffect transition="in" filter="fade">
+                                      <p:cBhvr>
+                                        <p:cTn id="24" dur="1000"/>
+                                        <p:tgtEl>
+                                          <p:spTgt spid="6"/>
+                                        </p:tgtEl>
+                                      </p:cBhvr>
+                                    </p:animEffect>
+                                    <p:anim calcmode="lin" valueType="num">
+                                      <p:cBhvr>
+                                        <p:cTn id="25" dur="1000" fill="hold"/>
+                                        <p:tgtEl>
+                                          <p:spTgt spid="6"/>
+                                        </p:tgtEl>
+                                        <p:attrNameLst>
+                                          <p:attrName>ppt_x</p:attrName>
+                                        </p:attrNameLst>
+                                      </p:cBhvr>
+                                      <p:tavLst>
+                                        <p:tav tm="0">
+                                          <p:val>
+                                            <p:strVal val="#ppt_x"/>
+                                          </p:val>
+                                        </p:tav>
+                                        <p:tav tm="100000">
+                                          <p:val>
+                                            <p:strVal val="#ppt_x"/>
+                                          </p:val>
+                                        </p:tav>
+                                      </p:tavLst>
+                                    </p:anim>
+                                    <p:anim calcmode="lin" valueType="num">
+                                      <p:cBhvr>
+                                        <p:cTn id="26" dur="1000" fill="hold"/>
+                                        <p:tgtEl>
+                                          <p:spTgt spid="6"/>
+                                        </p:tgtEl>
+                                        <p:attrNameLst>
+                                          <p:attrName>ppt_y</p:attrName>
+                                        </p:attrNameLst>
+                                      </p:cBhvr>
+                                      <p:tavLst>
+                                        <p:tav tm="0">
+                                          <p:val>
+                                            <p:strVal val="#ppt_y+.1"/>
+                                          </p:val>
+                                        </p:tav>
+                                        <p:tav tm="100000">
+                                          <p:val>
+                                            <p:strVal val="#ppt_y"/>
+                                          </p:val>
+                                        </p:tav>
+                                      </p:tavLst>
+                                    </p:anim>
+                                  </p:childTnLst>
+                                </p:cTn>
+                              </p:par>
+                              <p:par>
+                                <p:cTn id="27" presetID="42" presetClass="entr" presetSubtype="0" fill="hold" nodeType="withEffect">
+                                  <p:stCondLst>
+                                    <p:cond delay="0"/>
+                                  </p:stCondLst>
+                                  <p:childTnLst>
+                                    <p:set>
+                                      <p:cBhvr>
+                                        <p:cTn id="28" dur="1" fill="hold">
+                                          <p:stCondLst>
+                                            <p:cond delay="0"/>
+                                          </p:stCondLst>
+                                        </p:cTn>
+                                        <p:tgtEl>
+                                          <p:spTgt spid="7"/>
+                                        </p:tgtEl>
+                                        <p:attrNameLst>
+                                          <p:attrName>style.visibility</p:attrName>
+                                        </p:attrNameLst>
+                                      </p:cBhvr>
+                                      <p:to>
+                                        <p:strVal val="visible"/>
+                                      </p:to>
+                                    </p:set>
+                                    <p:animEffect transition="in" filter="fade">
+                                      <p:cBhvr>
+                                        <p:cTn id="29" dur="1000"/>
+                                        <p:tgtEl>
+                                          <p:spTgt spid="7"/>
+                                        </p:tgtEl>
+                                      </p:cBhvr>
+                                    </p:animEffect>
+                                    <p:anim calcmode="lin" valueType="num">
+                                      <p:cBhvr>
+                                        <p:cTn id="30" dur="1000" fill="hold"/>
+                                        <p:tgtEl>
+                                          <p:spTgt spid="7"/>
+                                        </p:tgtEl>
+                                        <p:attrNameLst>
+                                          <p:attrName>ppt_x</p:attrName>
+                                        </p:attrNameLst>
+                                      </p:cBhvr>
+                                      <p:tavLst>
+                                        <p:tav tm="0">
+                                          <p:val>
+                                            <p:strVal val="#ppt_x"/>
+                                          </p:val>
+                                        </p:tav>
+                                        <p:tav tm="100000">
+                                          <p:val>
+                                            <p:strVal val="#ppt_x"/>
+                                          </p:val>
+                                        </p:tav>
+                                      </p:tavLst>
+                                    </p:anim>
+                                    <p:anim calcmode="lin" valueType="num">
+                                      <p:cBhvr>
+                                        <p:cTn id="31" dur="1000" fill="hold"/>
+                                        <p:tgtEl>
+                                          <p:spTgt spid="7"/>
+                                        </p:tgtEl>
+                                        <p:attrNameLst>
+                                          <p:attrName>ppt_y</p:attrName>
+                                        </p:attrNameLst>
+                                      </p:cBhvr>
+                                      <p:tavLst>
+                                        <p:tav tm="0">
+                                          <p:val>
+                                            <p:strVal val="#ppt_y+.1"/>
+                                          </p:val>
+                                        </p:tav>
+                                        <p:tav tm="100000">
+                                          <p:val>
+                                            <p:strVal val="#ppt_y"/>
+                                          </p:val>
+                                        </p:tav>
+                                      </p:tavLst>
+                                    </p:anim>
+                                  </p:childTnLst>
+                                </p:cTn>
+                              </p:par>
+                            </p:childTnLst>
+                          </p:cTn>
+                        </p:par>
+                      </p:childTnLst>
+                    </p:cTn>
+                  </p:par>
+                  <p:par>
+                    <p:cTn id="32" fill="hold">
+                      <p:stCondLst>
+                        <p:cond delay="indefinite"/>
+                      </p:stCondLst>
+                      <p:childTnLst>
+                        <p:par>
+                          <p:cTn id="33" fill="hold">
+                            <p:stCondLst>
+                              <p:cond delay="0"/>
+                            </p:stCondLst>
+                            <p:childTnLst>
+                              <p:par>
+                                <p:cTn id="34" presetID="42" presetClass="entr" presetSubtype="0" fill="hold" nodeType="clickEffect">
+                                  <p:stCondLst>
+                                    <p:cond delay="0"/>
+                                  </p:stCondLst>
+                                  <p:childTnLst>
+                                    <p:set>
+                                      <p:cBhvr>
+                                        <p:cTn id="35" dur="1" fill="hold">
+                                          <p:stCondLst>
+                                            <p:cond delay="0"/>
+                                          </p:stCondLst>
+                                        </p:cTn>
+                                        <p:tgtEl>
+                                          <p:spTgt spid="5"/>
+                                        </p:tgtEl>
+                                        <p:attrNameLst>
+                                          <p:attrName>style.visibility</p:attrName>
+                                        </p:attrNameLst>
+                                      </p:cBhvr>
+                                      <p:to>
+                                        <p:strVal val="visible"/>
+                                      </p:to>
+                                    </p:set>
+                                    <p:animEffect transition="in" filter="fade">
+                                      <p:cBhvr>
+                                        <p:cTn id="36" dur="1000"/>
+                                        <p:tgtEl>
+                                          <p:spTgt spid="5"/>
+                                        </p:tgtEl>
+                                      </p:cBhvr>
+                                    </p:animEffect>
+                                    <p:anim calcmode="lin" valueType="num">
+                                      <p:cBhvr>
+                                        <p:cTn id="37" dur="1000" fill="hold"/>
+                                        <p:tgtEl>
+                                          <p:spTgt spid="5"/>
+                                        </p:tgtEl>
+                                        <p:attrNameLst>
+                                          <p:attrName>ppt_x</p:attrName>
+                                        </p:attrNameLst>
+                                      </p:cBhvr>
+                                      <p:tavLst>
+                                        <p:tav tm="0">
+                                          <p:val>
+                                            <p:strVal val="#ppt_x"/>
+                                          </p:val>
+                                        </p:tav>
+                                        <p:tav tm="100000">
+                                          <p:val>
+                                            <p:strVal val="#ppt_x"/>
+                                          </p:val>
+                                        </p:tav>
+                                      </p:tavLst>
+                                    </p:anim>
+                                    <p:anim calcmode="lin" valueType="num">
+                                      <p:cBhvr>
+                                        <p:cTn id="38" dur="1000" fill="hold"/>
+                                        <p:tgtEl>
+                                          <p:spTgt spid="5"/>
+                                        </p:tgtEl>
+                                        <p:attrNameLst>
+                                          <p:attrName>ppt_y</p:attrName>
+                                        </p:attrNameLst>
+                                      </p:cBhvr>
+                                      <p:tavLst>
+                                        <p:tav tm="0">
+                                          <p:val>
+                                            <p:strVal val="#ppt_y+.1"/>
+                                          </p:val>
+                                        </p:tav>
+                                        <p:tav tm="100000">
+                                          <p:val>
+                                            <p:strVal val="#ppt_y"/>
+                                          </p:val>
+                                        </p:tav>
+                                      </p:tavLst>
+                                    </p:anim>
+                                  </p:childTnLst>
+                                </p:cTn>
+                              </p:par>
+                            </p:childTnLst>
+                          </p:cTn>
+                        </p:par>
+                      </p:childTnLst>
+                    </p:cTn>
+                  </p:par>
+                  <p:par>
+                    <p:cTn id="39" fill="hold">
+                      <p:stCondLst>
+                        <p:cond delay="indefinite"/>
+                      </p:stCondLst>
+                      <p:childTnLst>
+                        <p:par>
+                          <p:cTn id="40" fill="hold">
+                            <p:stCondLst>
+                              <p:cond delay="0"/>
+                            </p:stCondLst>
+                            <p:childTnLst>
+                              <p:par>
+                                <p:cTn id="41" presetID="42" presetClass="entr" presetSubtype="0" fill="hold" nodeType="clickEffect">
+                                  <p:stCondLst>
+                                    <p:cond delay="0"/>
+                                  </p:stCondLst>
+                                  <p:childTnLst>
+                                    <p:set>
+                                      <p:cBhvr>
+                                        <p:cTn id="42" dur="1" fill="hold">
+                                          <p:stCondLst>
+                                            <p:cond delay="0"/>
+                                          </p:stCondLst>
+                                        </p:cTn>
+                                        <p:tgtEl>
+                                          <p:spTgt spid="4"/>
+                                        </p:tgtEl>
+                                        <p:attrNameLst>
+                                          <p:attrName>style.visibility</p:attrName>
+                                        </p:attrNameLst>
+                                      </p:cBhvr>
+                                      <p:to>
+                                        <p:strVal val="visible"/>
+                                      </p:to>
+                                    </p:set>
+                                    <p:animEffect transition="in" filter="fade">
+                                      <p:cBhvr>
+                                        <p:cTn id="43" dur="1000"/>
+                                        <p:tgtEl>
+                                          <p:spTgt spid="4"/>
+                                        </p:tgtEl>
+                                      </p:cBhvr>
+                                    </p:animEffect>
+                                    <p:anim calcmode="lin" valueType="num">
+                                      <p:cBhvr>
+                                        <p:cTn id="44" dur="1000" fill="hold"/>
+                                        <p:tgtEl>
+                                          <p:spTgt spid="4"/>
+                                        </p:tgtEl>
+                                        <p:attrNameLst>
+                                          <p:attrName>ppt_x</p:attrName>
+                                        </p:attrNameLst>
+                                      </p:cBhvr>
+                                      <p:tavLst>
+                                        <p:tav tm="0">
+                                          <p:val>
+                                            <p:strVal val="#ppt_x"/>
+                                          </p:val>
+                                        </p:tav>
+                                        <p:tav tm="100000">
+                                          <p:val>
+                                            <p:strVal val="#ppt_x"/>
+                                          </p:val>
+                                        </p:tav>
+                                      </p:tavLst>
+                                    </p:anim>
+                                    <p:anim calcmode="lin" valueType="num">
+                                      <p:cBhvr>
+                                        <p:cTn id="45" dur="1000" fill="hold"/>
+                                        <p:tgtEl>
+                                          <p:spTgt spid="4"/>
+                                        </p:tgtEl>
+                                        <p:attrNameLst>
+                                          <p:attrName>ppt_y</p:attrName>
+                                        </p:attrNameLst>
+                                      </p:cBhvr>
+                                      <p:tavLst>
+                                        <p:tav tm="0">
+                                          <p:val>
+                                            <p:strVal val="#ppt_y+.1"/>
+                                          </p:val>
+                                        </p:tav>
+                                        <p:tav tm="100000">
+                                          <p:val>
+                                            <p:strVal val="#ppt_y"/>
+                                          </p:val>
+                                        </p:tav>
+                                      </p:tavLst>
+                                    </p:anim>
+                                  </p:childTnLst>
+                                </p:cTn>
+                              </p:par>
+                            </p:childTnLst>
+                          </p:cTn>
+                        </p:par>
+                      </p:childTnLst>
+                    </p:cTn>
+                  </p:par>
+                </p:childTnLst>
+              </p:cTn>
+              <p:prevCondLst>
+                <p:cond evt="onPrev" delay="0">
+                  <p:tgtEl>
+                    <p:sldTgt/>
+                  </p:tgtEl>
+                </p:cond>
+              </p:prevCondLst>
+              <p:nextCondLst>
+                <p:cond evt="onNext" delay="0">
+                  <p:tgtEl>
+                    <p:sldTgt/>
+                  </p:tgtEl>
+                </p:cond>
+              </p:nextCondLst>
+            </p:seq>
+          </p:childTnLst>
+        </p:cTn>
+      </p:par>
+    </p:tnLst>
+  </p:timing>
+</p:sld>
+</file>
+
+<file path=ppt/slides/slide5.xml><?xml version="1.0" encoding="utf-8"?>
+<p:sld xmlns:a="http://schemas.openxmlformats.org/drawingml/2006/main" xmlns:r="http://schemas.openxmlformats.org/officeDocument/2006/relationships" xmlns:p="http://schemas.openxmlformats.org/presentationml/2006/main">
+  <p:cSld>
+    <p:spTree>
+      <p:nvGrpSpPr>
+        <p:cNvPr id="1" name=""/>
+        <p:cNvGrpSpPr/>
+        <p:nvPr/>
+      </p:nvGrpSpPr>
+      <p:grpSpPr>
+        <a:xfrm>
+          <a:off x="0" y="0"/>
+          <a:ext cx="0" cy="0"/>
+          <a:chOff x="0" y="0"/>
+          <a:chExt cx="0" cy="0"/>
+        </a:xfrm>
+      </p:grpSpPr>
+      <p:sp>
+        <p:nvSpPr>
+          <p:cNvPr id="4" name="Text Box 1">
+            <a:extLst>
+              <a:ext uri="{FF2B5EF4-FFF2-40B4-BE49-F238E27FC236}">
+                <a16:creationId xmlns:a16="http://schemas.microsoft.com/office/drawing/2014/main" id="{8118B50D-9A44-46FD-9E32-AC4B58280387}"/>
+              </a:ext>
+            </a:extLst>
+          </p:cNvPr>
+          <p:cNvSpPr txBox="1">
+            <a:spLocks noChangeArrowheads="1"/>
+          </p:cNvSpPr>
+          <p:nvPr/>
+        </p:nvSpPr>
+        <p:spPr bwMode="auto">
+          <a:xfrm>
+            <a:off x="398177" y="431775"/>
+            <a:ext cx="10655300" cy="900113"/>
+          </a:xfrm>
+          <a:prstGeom prst="rect">
+            <a:avLst/>
+          </a:prstGeom>
+          <a:noFill/>
+          <a:ln>
+            <a:noFill/>
+          </a:ln>
+          <a:effectLst/>
+          <a:extLst>
+            <a:ext uri="{909E8E84-426E-40DD-AFC4-6F175D3DCCD1}">
+              <a14:hiddenFill xmlns:a14="http://schemas.microsoft.com/office/drawing/2010/main">
+                <a:solidFill>
+                  <a:srgbClr val="FFFFFF"/>
+                </a:solidFill>
+              </a14:hiddenFill>
+            </a:ext>
+            <a:ext uri="{91240B29-F687-4F45-9708-019B960494DF}">
+              <a14:hiddenLine xmlns:a14="http://schemas.microsoft.com/office/drawing/2010/main" w="9525">
+                <a:solidFill>
+                  <a:srgbClr val="808080"/>
+                </a:solidFill>
+                <a:round/>
+                <a:headEnd/>
+                <a:tailEnd/>
+              </a14:hiddenLine>
+            </a:ext>
+            <a:ext uri="{AF507438-7753-43E0-B8FC-AC1667EBCBE1}">
+              <a14:hiddenEffects xmlns:a14="http://schemas.microsoft.com/office/drawing/2010/main">
+                <a:effectLst>
+                  <a:outerShdw dist="35921" dir="2700000" algn="ctr" rotWithShape="0">
+                    <a:srgbClr val="808080"/>
+                  </a:outerShdw>
+                </a:effectLst>
+              </a14:hiddenEffects>
+            </a:ext>
+          </a:extLst>
+        </p:spPr>
+        <p:txBody>
+          <a:bodyPr lIns="0" tIns="0" rIns="0" bIns="0"/>
+          <a:lstStyle>
+            <a:lvl1pPr>
+              <a:buClr>
+                <a:srgbClr val="000000"/>
+              </a:buClr>
+              <a:buSzPct val="100000"/>
+              <a:buFont typeface="Times New Roman" panose="02020603050405020304" pitchFamily="18" charset="0"/>
+              <a:tabLst>
+                <a:tab pos="0" algn="l"/>
+                <a:tab pos="447675" algn="l"/>
+                <a:tab pos="896938" algn="l"/>
+                <a:tab pos="1346200" algn="l"/>
+                <a:tab pos="1795463" algn="l"/>
+                <a:tab pos="2244725" algn="l"/>
+                <a:tab pos="2693988" algn="l"/>
+                <a:tab pos="3143250" algn="l"/>
+                <a:tab pos="3592513" algn="l"/>
+                <a:tab pos="4041775" algn="l"/>
+                <a:tab pos="4491038" algn="l"/>
+                <a:tab pos="4940300" algn="l"/>
+                <a:tab pos="5389563" algn="l"/>
+                <a:tab pos="5838825" algn="l"/>
+                <a:tab pos="6288088" algn="l"/>
+                <a:tab pos="6737350" algn="l"/>
+                <a:tab pos="7186613" algn="l"/>
+                <a:tab pos="7635875" algn="l"/>
+                <a:tab pos="8085138" algn="l"/>
+                <a:tab pos="8534400" algn="l"/>
+                <a:tab pos="8983663" algn="l"/>
+                <a:tab pos="9410700" algn="l"/>
+                <a:tab pos="10134600" algn="l"/>
+              </a:tabLst>
+              <a:defRPr sz="2000">
+                <a:solidFill>
+                  <a:schemeClr val="bg1"/>
+                </a:solidFill>
+                <a:latin typeface="Arial" panose="020B0604020202020204" pitchFamily="34" charset="0"/>
+                <a:ea typeface="Microsoft YaHei" panose="020B0503020204020204" pitchFamily="34" charset="-122"/>
+              </a:defRPr>
+            </a:lvl1pPr>
+            <a:lvl2pPr>
+              <a:buClr>
+                <a:srgbClr val="000000"/>
+              </a:buClr>
+              <a:buSzPct val="100000"/>
+              <a:buFont typeface="Times New Roman" panose="02020603050405020304" pitchFamily="18" charset="0"/>
+              <a:tabLst>
+                <a:tab pos="0" algn="l"/>
+                <a:tab pos="447675" algn="l"/>
+                <a:tab pos="896938" algn="l"/>
+                <a:tab pos="1346200" algn="l"/>
+                <a:tab pos="1795463" algn="l"/>
+                <a:tab pos="2244725" algn="l"/>
+                <a:tab pos="2693988" algn="l"/>
+                <a:tab pos="3143250" algn="l"/>
+                <a:tab pos="3592513" algn="l"/>
+                <a:tab pos="4041775" algn="l"/>
+                <a:tab pos="4491038" algn="l"/>
+                <a:tab pos="4940300" algn="l"/>
+                <a:tab pos="5389563" algn="l"/>
+                <a:tab pos="5838825" algn="l"/>
+                <a:tab pos="6288088" algn="l"/>
+                <a:tab pos="6737350" algn="l"/>
+                <a:tab pos="7186613" algn="l"/>
+                <a:tab pos="7635875" algn="l"/>
+                <a:tab pos="8085138" algn="l"/>
+                <a:tab pos="8534400" algn="l"/>
+                <a:tab pos="8983663" algn="l"/>
+                <a:tab pos="9410700" algn="l"/>
+                <a:tab pos="10134600" algn="l"/>
+              </a:tabLst>
+              <a:defRPr sz="2000">
+                <a:solidFill>
+                  <a:schemeClr val="bg1"/>
+                </a:solidFill>
+                <a:latin typeface="Arial" panose="020B0604020202020204" pitchFamily="34" charset="0"/>
+                <a:ea typeface="Microsoft YaHei" panose="020B0503020204020204" pitchFamily="34" charset="-122"/>
+              </a:defRPr>
+            </a:lvl2pPr>
+            <a:lvl3pPr>
+              <a:buClr>
+                <a:srgbClr val="000000"/>
+              </a:buClr>
+              <a:buSzPct val="100000"/>
+              <a:buFont typeface="Times New Roman" panose="02020603050405020304" pitchFamily="18" charset="0"/>
+              <a:tabLst>
+                <a:tab pos="0" algn="l"/>
+                <a:tab pos="447675" algn="l"/>
+                <a:tab pos="896938" algn="l"/>
+                <a:tab pos="1346200" algn="l"/>
+                <a:tab pos="1795463" algn="l"/>
+                <a:tab pos="2244725" algn="l"/>
+                <a:tab pos="2693988" algn="l"/>
+                <a:tab pos="3143250" algn="l"/>
+                <a:tab pos="3592513" algn="l"/>
+                <a:tab pos="4041775" algn="l"/>
+                <a:tab pos="4491038" algn="l"/>
+                <a:tab pos="4940300" algn="l"/>
+                <a:tab pos="5389563" algn="l"/>
+                <a:tab pos="5838825" algn="l"/>
+                <a:tab pos="6288088" algn="l"/>
+                <a:tab pos="6737350" algn="l"/>
+                <a:tab pos="7186613" algn="l"/>
+                <a:tab pos="7635875" algn="l"/>
+                <a:tab pos="8085138" algn="l"/>
+                <a:tab pos="8534400" algn="l"/>
+                <a:tab pos="8983663" algn="l"/>
+                <a:tab pos="9410700" algn="l"/>
+                <a:tab pos="10134600" algn="l"/>
+              </a:tabLst>
+              <a:defRPr sz="2000">
+                <a:solidFill>
+                  <a:schemeClr val="bg1"/>
+                </a:solidFill>
+                <a:latin typeface="Arial" panose="020B0604020202020204" pitchFamily="34" charset="0"/>
+                <a:ea typeface="Microsoft YaHei" panose="020B0503020204020204" pitchFamily="34" charset="-122"/>
+              </a:defRPr>
+            </a:lvl3pPr>
+            <a:lvl4pPr>
+              <a:buClr>
+                <a:srgbClr val="000000"/>
+              </a:buClr>
+              <a:buSzPct val="100000"/>
+              <a:buFont typeface="Times New Roman" panose="02020603050405020304" pitchFamily="18" charset="0"/>
+              <a:tabLst>
+                <a:tab pos="0" algn="l"/>
+                <a:tab pos="447675" algn="l"/>
+                <a:tab pos="896938" algn="l"/>
+                <a:tab pos="1346200" algn="l"/>
+                <a:tab pos="1795463" algn="l"/>
+                <a:tab pos="2244725" algn="l"/>
+                <a:tab pos="2693988" algn="l"/>
+                <a:tab pos="3143250" algn="l"/>
+                <a:tab pos="3592513" algn="l"/>
+                <a:tab pos="4041775" algn="l"/>
+                <a:tab pos="4491038" algn="l"/>
+                <a:tab pos="4940300" algn="l"/>
+                <a:tab pos="5389563" algn="l"/>
+                <a:tab pos="5838825" algn="l"/>
+                <a:tab pos="6288088" algn="l"/>
+                <a:tab pos="6737350" algn="l"/>
+                <a:tab pos="7186613" algn="l"/>
+                <a:tab pos="7635875" algn="l"/>
+                <a:tab pos="8085138" algn="l"/>
+                <a:tab pos="8534400" algn="l"/>
+                <a:tab pos="8983663" algn="l"/>
+                <a:tab pos="9410700" algn="l"/>
+                <a:tab pos="10134600" algn="l"/>
+              </a:tabLst>
+              <a:defRPr sz="2000">
+                <a:solidFill>
+                  <a:schemeClr val="bg1"/>
+                </a:solidFill>
+                <a:latin typeface="Arial" panose="020B0604020202020204" pitchFamily="34" charset="0"/>
+                <a:ea typeface="Microsoft YaHei" panose="020B0503020204020204" pitchFamily="34" charset="-122"/>
+              </a:defRPr>
+            </a:lvl4pPr>
+            <a:lvl5pPr>
+              <a:buClr>
+                <a:srgbClr val="000000"/>
+              </a:buClr>
+              <a:buSzPct val="100000"/>
+              <a:buFont typeface="Times New Roman" panose="02020603050405020304" pitchFamily="18" charset="0"/>
+              <a:tabLst>
+                <a:tab pos="0" algn="l"/>
+                <a:tab pos="447675" algn="l"/>
+                <a:tab pos="896938" algn="l"/>
+                <a:tab pos="1346200" algn="l"/>
+                <a:tab pos="1795463" algn="l"/>
+                <a:tab pos="2244725" algn="l"/>
+                <a:tab pos="2693988" algn="l"/>
+                <a:tab pos="3143250" algn="l"/>
+                <a:tab pos="3592513" algn="l"/>
+                <a:tab pos="4041775" algn="l"/>
+                <a:tab pos="4491038" algn="l"/>
+                <a:tab pos="4940300" algn="l"/>
+                <a:tab pos="5389563" algn="l"/>
+                <a:tab pos="5838825" algn="l"/>
+                <a:tab pos="6288088" algn="l"/>
+                <a:tab pos="6737350" algn="l"/>
+                <a:tab pos="7186613" algn="l"/>
+                <a:tab pos="7635875" algn="l"/>
+                <a:tab pos="8085138" algn="l"/>
+                <a:tab pos="8534400" algn="l"/>
+                <a:tab pos="8983663" algn="l"/>
+                <a:tab pos="9410700" algn="l"/>
+                <a:tab pos="10134600" algn="l"/>
+              </a:tabLst>
+              <a:defRPr sz="2000">
+                <a:solidFill>
+                  <a:schemeClr val="bg1"/>
+                </a:solidFill>
+                <a:latin typeface="Arial" panose="020B0604020202020204" pitchFamily="34" charset="0"/>
+                <a:ea typeface="Microsoft YaHei" panose="020B0503020204020204" pitchFamily="34" charset="-122"/>
+              </a:defRPr>
+            </a:lvl5pPr>
+            <a:lvl6pPr marL="2514600" indent="-228600" defTabSz="449263" eaLnBrk="0" fontAlgn="base" hangingPunct="0">
+              <a:spcBef>
+                <a:spcPct val="0"/>
+              </a:spcBef>
+              <a:spcAft>
+                <a:spcPct val="0"/>
+              </a:spcAft>
+              <a:buClr>
+                <a:srgbClr val="000000"/>
+              </a:buClr>
+              <a:buSzPct val="100000"/>
+              <a:buFont typeface="Times New Roman" panose="02020603050405020304" pitchFamily="18" charset="0"/>
+              <a:tabLst>
+                <a:tab pos="0" algn="l"/>
+                <a:tab pos="447675" algn="l"/>
+                <a:tab pos="896938" algn="l"/>
+                <a:tab pos="1346200" algn="l"/>
+                <a:tab pos="1795463" algn="l"/>
+                <a:tab pos="2244725" algn="l"/>
+                <a:tab pos="2693988" algn="l"/>
+                <a:tab pos="3143250" algn="l"/>
+                <a:tab pos="3592513" algn="l"/>
+                <a:tab pos="4041775" algn="l"/>
+                <a:tab pos="4491038" algn="l"/>
+                <a:tab pos="4940300" algn="l"/>
+                <a:tab pos="5389563" algn="l"/>
+                <a:tab pos="5838825" algn="l"/>
+                <a:tab pos="6288088" algn="l"/>
+                <a:tab pos="6737350" algn="l"/>
+                <a:tab pos="7186613" algn="l"/>
+                <a:tab pos="7635875" algn="l"/>
+                <a:tab pos="8085138" algn="l"/>
+                <a:tab pos="8534400" algn="l"/>
+                <a:tab pos="8983663" algn="l"/>
+                <a:tab pos="9410700" algn="l"/>
+                <a:tab pos="10134600" algn="l"/>
+              </a:tabLst>
+              <a:defRPr sz="2000">
+                <a:solidFill>
+                  <a:schemeClr val="bg1"/>
+                </a:solidFill>
+                <a:latin typeface="Arial" panose="020B0604020202020204" pitchFamily="34" charset="0"/>
+                <a:ea typeface="Microsoft YaHei" panose="020B0503020204020204" pitchFamily="34" charset="-122"/>
+              </a:defRPr>
+            </a:lvl6pPr>
+            <a:lvl7pPr marL="2971800" indent="-228600" defTabSz="449263" eaLnBrk="0" fontAlgn="base" hangingPunct="0">
+              <a:spcBef>
+                <a:spcPct val="0"/>
+              </a:spcBef>
+              <a:spcAft>
+                <a:spcPct val="0"/>
+              </a:spcAft>
+              <a:buClr>
+                <a:srgbClr val="000000"/>
+              </a:buClr>
+              <a:buSzPct val="100000"/>
+              <a:buFont typeface="Times New Roman" panose="02020603050405020304" pitchFamily="18" charset="0"/>
+              <a:tabLst>
+                <a:tab pos="0" algn="l"/>
+                <a:tab pos="447675" algn="l"/>
+                <a:tab pos="896938" algn="l"/>
+                <a:tab pos="1346200" algn="l"/>
+                <a:tab pos="1795463" algn="l"/>
+                <a:tab pos="2244725" algn="l"/>
+                <a:tab pos="2693988" algn="l"/>
+                <a:tab pos="3143250" algn="l"/>
+                <a:tab pos="3592513" algn="l"/>
+                <a:tab pos="4041775" algn="l"/>
+                <a:tab pos="4491038" algn="l"/>
+                <a:tab pos="4940300" algn="l"/>
+                <a:tab pos="5389563" algn="l"/>
+                <a:tab pos="5838825" algn="l"/>
+                <a:tab pos="6288088" algn="l"/>
+                <a:tab pos="6737350" algn="l"/>
+                <a:tab pos="7186613" algn="l"/>
+                <a:tab pos="7635875" algn="l"/>
+                <a:tab pos="8085138" algn="l"/>
+                <a:tab pos="8534400" algn="l"/>
+                <a:tab pos="8983663" algn="l"/>
+                <a:tab pos="9410700" algn="l"/>
+                <a:tab pos="10134600" algn="l"/>
+              </a:tabLst>
+              <a:defRPr sz="2000">
+                <a:solidFill>
+                  <a:schemeClr val="bg1"/>
+                </a:solidFill>
+                <a:latin typeface="Arial" panose="020B0604020202020204" pitchFamily="34" charset="0"/>
+                <a:ea typeface="Microsoft YaHei" panose="020B0503020204020204" pitchFamily="34" charset="-122"/>
+              </a:defRPr>
+            </a:lvl7pPr>
+            <a:lvl8pPr marL="3429000" indent="-228600" defTabSz="449263" eaLnBrk="0" fontAlgn="base" hangingPunct="0">
+              <a:spcBef>
+                <a:spcPct val="0"/>
+              </a:spcBef>
+              <a:spcAft>
+                <a:spcPct val="0"/>
+              </a:spcAft>
+              <a:buClr>
+                <a:srgbClr val="000000"/>
+              </a:buClr>
+              <a:buSzPct val="100000"/>
+              <a:buFont typeface="Times New Roman" panose="02020603050405020304" pitchFamily="18" charset="0"/>
+              <a:tabLst>
+                <a:tab pos="0" algn="l"/>
+                <a:tab pos="447675" algn="l"/>
+                <a:tab pos="896938" algn="l"/>
+                <a:tab pos="1346200" algn="l"/>
+                <a:tab pos="1795463" algn="l"/>
+                <a:tab pos="2244725" algn="l"/>
+                <a:tab pos="2693988" algn="l"/>
+                <a:tab pos="3143250" algn="l"/>
+                <a:tab pos="3592513" algn="l"/>
+                <a:tab pos="4041775" algn="l"/>
+                <a:tab pos="4491038" algn="l"/>
+                <a:tab pos="4940300" algn="l"/>
+                <a:tab pos="5389563" algn="l"/>
+                <a:tab pos="5838825" algn="l"/>
+                <a:tab pos="6288088" algn="l"/>
+                <a:tab pos="6737350" algn="l"/>
+                <a:tab pos="7186613" algn="l"/>
+                <a:tab pos="7635875" algn="l"/>
+                <a:tab pos="8085138" algn="l"/>
+                <a:tab pos="8534400" algn="l"/>
+                <a:tab pos="8983663" algn="l"/>
+                <a:tab pos="9410700" algn="l"/>
+                <a:tab pos="10134600" algn="l"/>
+              </a:tabLst>
+              <a:defRPr sz="2000">
+                <a:solidFill>
+                  <a:schemeClr val="bg1"/>
+                </a:solidFill>
+                <a:latin typeface="Arial" panose="020B0604020202020204" pitchFamily="34" charset="0"/>
+                <a:ea typeface="Microsoft YaHei" panose="020B0503020204020204" pitchFamily="34" charset="-122"/>
+              </a:defRPr>
+            </a:lvl8pPr>
+            <a:lvl9pPr marL="3886200" indent="-228600" defTabSz="449263" eaLnBrk="0" fontAlgn="base" hangingPunct="0">
+              <a:spcBef>
+                <a:spcPct val="0"/>
+              </a:spcBef>
+              <a:spcAft>
+                <a:spcPct val="0"/>
+              </a:spcAft>
+              <a:buClr>
+                <a:srgbClr val="000000"/>
+              </a:buClr>
+              <a:buSzPct val="100000"/>
+              <a:buFont typeface="Times New Roman" panose="02020603050405020304" pitchFamily="18" charset="0"/>
+              <a:tabLst>
+                <a:tab pos="0" algn="l"/>
+                <a:tab pos="447675" algn="l"/>
+                <a:tab pos="896938" algn="l"/>
+                <a:tab pos="1346200" algn="l"/>
+                <a:tab pos="1795463" algn="l"/>
+                <a:tab pos="2244725" algn="l"/>
+                <a:tab pos="2693988" algn="l"/>
+                <a:tab pos="3143250" algn="l"/>
+                <a:tab pos="3592513" algn="l"/>
+                <a:tab pos="4041775" algn="l"/>
+                <a:tab pos="4491038" algn="l"/>
+                <a:tab pos="4940300" algn="l"/>
+                <a:tab pos="5389563" algn="l"/>
+                <a:tab pos="5838825" algn="l"/>
+                <a:tab pos="6288088" algn="l"/>
+                <a:tab pos="6737350" algn="l"/>
+                <a:tab pos="7186613" algn="l"/>
+                <a:tab pos="7635875" algn="l"/>
+                <a:tab pos="8085138" algn="l"/>
+                <a:tab pos="8534400" algn="l"/>
+                <a:tab pos="8983663" algn="l"/>
+                <a:tab pos="9410700" algn="l"/>
+                <a:tab pos="10134600" algn="l"/>
+              </a:tabLst>
+              <a:defRPr sz="2000">
+                <a:solidFill>
+                  <a:schemeClr val="bg1"/>
+                </a:solidFill>
+                <a:latin typeface="Arial" panose="020B0604020202020204" pitchFamily="34" charset="0"/>
+                <a:ea typeface="Microsoft YaHei" panose="020B0503020204020204" pitchFamily="34" charset="-122"/>
+              </a:defRPr>
+            </a:lvl9pPr>
+          </a:lstStyle>
+          <a:p>
+            <a:pPr eaLnBrk="1" hangingPunct="1">
+              <a:buClrTx/>
+            </a:pPr>
+            <a:r>
+              <a:rPr lang="fr-CH" altLang="fr-FR" sz="4800" b="1" dirty="0">
+                <a:solidFill>
+                  <a:srgbClr val="000000"/>
+                </a:solidFill>
+              </a:rPr>
               <a:t>Divers tests effectués</a:t>
             </a:r>
           </a:p>
@@ -18012,8 +19792,8 @@
         </p:blipFill>
         <p:spPr>
           <a:xfrm>
-            <a:off x="1081311" y="1799927"/>
-            <a:ext cx="3360711" cy="419136"/>
+            <a:off x="937294" y="1947727"/>
+            <a:ext cx="4041615" cy="504056"/>
           </a:xfrm>
           <a:prstGeom prst="rect">
             <a:avLst/>
@@ -18042,7 +19822,7 @@
         </p:blipFill>
         <p:spPr>
           <a:xfrm>
-            <a:off x="1225327" y="2375991"/>
+            <a:off x="6219302" y="2508406"/>
             <a:ext cx="4054191" cy="762066"/>
           </a:xfrm>
           <a:prstGeom prst="rect">
@@ -18072,8 +19852,8 @@
         </p:blipFill>
         <p:spPr>
           <a:xfrm>
-            <a:off x="1873399" y="3326428"/>
-            <a:ext cx="3505504" cy="1828958"/>
+            <a:off x="611839" y="2736031"/>
+            <a:ext cx="4692523" cy="2448272"/>
           </a:xfrm>
           <a:prstGeom prst="rect">
             <a:avLst/>
@@ -18102,7 +19882,7 @@
         </p:blipFill>
         <p:spPr>
           <a:xfrm>
-            <a:off x="5833839" y="2200716"/>
+            <a:off x="5716878" y="3491496"/>
             <a:ext cx="5105842" cy="937341"/>
           </a:xfrm>
           <a:prstGeom prst="rect">
@@ -18120,10 +19900,574 @@
   <p:clrMapOvr>
     <a:masterClrMapping/>
   </p:clrMapOvr>
+  <mc:AlternateContent xmlns:mc="http://schemas.openxmlformats.org/markup-compatibility/2006">
+    <mc:Choice xmlns:p14="http://schemas.microsoft.com/office/powerpoint/2010/main" Requires="p14">
+      <p:transition spd="med" p14:dur="700">
+        <p:fade/>
+      </p:transition>
+    </mc:Choice>
+    <mc:Fallback>
+      <p:transition spd="med">
+        <p:fade/>
+      </p:transition>
+    </mc:Fallback>
+  </mc:AlternateContent>
 </p:sld>
 </file>
 
-<file path=ppt/slides/slide5.xml><?xml version="1.0" encoding="utf-8"?>
+<file path=ppt/slides/slide6.xml><?xml version="1.0" encoding="utf-8"?>
+<p:sld xmlns:a="http://schemas.openxmlformats.org/drawingml/2006/main" xmlns:r="http://schemas.openxmlformats.org/officeDocument/2006/relationships" xmlns:p="http://schemas.openxmlformats.org/presentationml/2006/main">
+  <p:cSld>
+    <p:spTree>
+      <p:nvGrpSpPr>
+        <p:cNvPr id="1" name=""/>
+        <p:cNvGrpSpPr/>
+        <p:nvPr/>
+      </p:nvGrpSpPr>
+      <p:grpSpPr>
+        <a:xfrm>
+          <a:off x="0" y="0"/>
+          <a:ext cx="0" cy="0"/>
+          <a:chOff x="0" y="0"/>
+          <a:chExt cx="0" cy="0"/>
+        </a:xfrm>
+      </p:grpSpPr>
+      <p:sp>
+        <p:nvSpPr>
+          <p:cNvPr id="2" name="Text Box 1">
+            <a:extLst>
+              <a:ext uri="{FF2B5EF4-FFF2-40B4-BE49-F238E27FC236}">
+                <a16:creationId xmlns:a16="http://schemas.microsoft.com/office/drawing/2014/main" id="{E4F6338D-BB9B-4F43-9425-E367CD5059A2}"/>
+              </a:ext>
+            </a:extLst>
+          </p:cNvPr>
+          <p:cNvSpPr txBox="1">
+            <a:spLocks noChangeArrowheads="1"/>
+          </p:cNvSpPr>
+          <p:nvPr/>
+        </p:nvSpPr>
+        <p:spPr bwMode="auto">
+          <a:xfrm>
+            <a:off x="398177" y="431775"/>
+            <a:ext cx="10655300" cy="900113"/>
+          </a:xfrm>
+          <a:prstGeom prst="rect">
+            <a:avLst/>
+          </a:prstGeom>
+          <a:noFill/>
+          <a:ln>
+            <a:noFill/>
+          </a:ln>
+          <a:effectLst/>
+          <a:extLst>
+            <a:ext uri="{909E8E84-426E-40DD-AFC4-6F175D3DCCD1}">
+              <a14:hiddenFill xmlns:a14="http://schemas.microsoft.com/office/drawing/2010/main">
+                <a:solidFill>
+                  <a:srgbClr val="FFFFFF"/>
+                </a:solidFill>
+              </a14:hiddenFill>
+            </a:ext>
+            <a:ext uri="{91240B29-F687-4F45-9708-019B960494DF}">
+              <a14:hiddenLine xmlns:a14="http://schemas.microsoft.com/office/drawing/2010/main" w="9525">
+                <a:solidFill>
+                  <a:srgbClr val="808080"/>
+                </a:solidFill>
+                <a:round/>
+                <a:headEnd/>
+                <a:tailEnd/>
+              </a14:hiddenLine>
+            </a:ext>
+            <a:ext uri="{AF507438-7753-43E0-B8FC-AC1667EBCBE1}">
+              <a14:hiddenEffects xmlns:a14="http://schemas.microsoft.com/office/drawing/2010/main">
+                <a:effectLst>
+                  <a:outerShdw dist="35921" dir="2700000" algn="ctr" rotWithShape="0">
+                    <a:srgbClr val="808080"/>
+                  </a:outerShdw>
+                </a:effectLst>
+              </a14:hiddenEffects>
+            </a:ext>
+          </a:extLst>
+        </p:spPr>
+        <p:txBody>
+          <a:bodyPr lIns="0" tIns="0" rIns="0" bIns="0"/>
+          <a:lstStyle>
+            <a:lvl1pPr>
+              <a:buClr>
+                <a:srgbClr val="000000"/>
+              </a:buClr>
+              <a:buSzPct val="100000"/>
+              <a:buFont typeface="Times New Roman" panose="02020603050405020304" pitchFamily="18" charset="0"/>
+              <a:tabLst>
+                <a:tab pos="0" algn="l"/>
+                <a:tab pos="447675" algn="l"/>
+                <a:tab pos="896938" algn="l"/>
+                <a:tab pos="1346200" algn="l"/>
+                <a:tab pos="1795463" algn="l"/>
+                <a:tab pos="2244725" algn="l"/>
+                <a:tab pos="2693988" algn="l"/>
+                <a:tab pos="3143250" algn="l"/>
+                <a:tab pos="3592513" algn="l"/>
+                <a:tab pos="4041775" algn="l"/>
+                <a:tab pos="4491038" algn="l"/>
+                <a:tab pos="4940300" algn="l"/>
+                <a:tab pos="5389563" algn="l"/>
+                <a:tab pos="5838825" algn="l"/>
+                <a:tab pos="6288088" algn="l"/>
+                <a:tab pos="6737350" algn="l"/>
+                <a:tab pos="7186613" algn="l"/>
+                <a:tab pos="7635875" algn="l"/>
+                <a:tab pos="8085138" algn="l"/>
+                <a:tab pos="8534400" algn="l"/>
+                <a:tab pos="8983663" algn="l"/>
+                <a:tab pos="9410700" algn="l"/>
+                <a:tab pos="10134600" algn="l"/>
+              </a:tabLst>
+              <a:defRPr sz="2000">
+                <a:solidFill>
+                  <a:schemeClr val="bg1"/>
+                </a:solidFill>
+                <a:latin typeface="Arial" panose="020B0604020202020204" pitchFamily="34" charset="0"/>
+                <a:ea typeface="Microsoft YaHei" panose="020B0503020204020204" pitchFamily="34" charset="-122"/>
+              </a:defRPr>
+            </a:lvl1pPr>
+            <a:lvl2pPr>
+              <a:buClr>
+                <a:srgbClr val="000000"/>
+              </a:buClr>
+              <a:buSzPct val="100000"/>
+              <a:buFont typeface="Times New Roman" panose="02020603050405020304" pitchFamily="18" charset="0"/>
+              <a:tabLst>
+                <a:tab pos="0" algn="l"/>
+                <a:tab pos="447675" algn="l"/>
+                <a:tab pos="896938" algn="l"/>
+                <a:tab pos="1346200" algn="l"/>
+                <a:tab pos="1795463" algn="l"/>
+                <a:tab pos="2244725" algn="l"/>
+                <a:tab pos="2693988" algn="l"/>
+                <a:tab pos="3143250" algn="l"/>
+                <a:tab pos="3592513" algn="l"/>
+                <a:tab pos="4041775" algn="l"/>
+                <a:tab pos="4491038" algn="l"/>
+                <a:tab pos="4940300" algn="l"/>
+                <a:tab pos="5389563" algn="l"/>
+                <a:tab pos="5838825" algn="l"/>
+                <a:tab pos="6288088" algn="l"/>
+                <a:tab pos="6737350" algn="l"/>
+                <a:tab pos="7186613" algn="l"/>
+                <a:tab pos="7635875" algn="l"/>
+                <a:tab pos="8085138" algn="l"/>
+                <a:tab pos="8534400" algn="l"/>
+                <a:tab pos="8983663" algn="l"/>
+                <a:tab pos="9410700" algn="l"/>
+                <a:tab pos="10134600" algn="l"/>
+              </a:tabLst>
+              <a:defRPr sz="2000">
+                <a:solidFill>
+                  <a:schemeClr val="bg1"/>
+                </a:solidFill>
+                <a:latin typeface="Arial" panose="020B0604020202020204" pitchFamily="34" charset="0"/>
+                <a:ea typeface="Microsoft YaHei" panose="020B0503020204020204" pitchFamily="34" charset="-122"/>
+              </a:defRPr>
+            </a:lvl2pPr>
+            <a:lvl3pPr>
+              <a:buClr>
+                <a:srgbClr val="000000"/>
+              </a:buClr>
+              <a:buSzPct val="100000"/>
+              <a:buFont typeface="Times New Roman" panose="02020603050405020304" pitchFamily="18" charset="0"/>
+              <a:tabLst>
+                <a:tab pos="0" algn="l"/>
+                <a:tab pos="447675" algn="l"/>
+                <a:tab pos="896938" algn="l"/>
+                <a:tab pos="1346200" algn="l"/>
+                <a:tab pos="1795463" algn="l"/>
+                <a:tab pos="2244725" algn="l"/>
+                <a:tab pos="2693988" algn="l"/>
+                <a:tab pos="3143250" algn="l"/>
+                <a:tab pos="3592513" algn="l"/>
+                <a:tab pos="4041775" algn="l"/>
+                <a:tab pos="4491038" algn="l"/>
+                <a:tab pos="4940300" algn="l"/>
+                <a:tab pos="5389563" algn="l"/>
+                <a:tab pos="5838825" algn="l"/>
+                <a:tab pos="6288088" algn="l"/>
+                <a:tab pos="6737350" algn="l"/>
+                <a:tab pos="7186613" algn="l"/>
+                <a:tab pos="7635875" algn="l"/>
+                <a:tab pos="8085138" algn="l"/>
+                <a:tab pos="8534400" algn="l"/>
+                <a:tab pos="8983663" algn="l"/>
+                <a:tab pos="9410700" algn="l"/>
+                <a:tab pos="10134600" algn="l"/>
+              </a:tabLst>
+              <a:defRPr sz="2000">
+                <a:solidFill>
+                  <a:schemeClr val="bg1"/>
+                </a:solidFill>
+                <a:latin typeface="Arial" panose="020B0604020202020204" pitchFamily="34" charset="0"/>
+                <a:ea typeface="Microsoft YaHei" panose="020B0503020204020204" pitchFamily="34" charset="-122"/>
+              </a:defRPr>
+            </a:lvl3pPr>
+            <a:lvl4pPr>
+              <a:buClr>
+                <a:srgbClr val="000000"/>
+              </a:buClr>
+              <a:buSzPct val="100000"/>
+              <a:buFont typeface="Times New Roman" panose="02020603050405020304" pitchFamily="18" charset="0"/>
+              <a:tabLst>
+                <a:tab pos="0" algn="l"/>
+                <a:tab pos="447675" algn="l"/>
+                <a:tab pos="896938" algn="l"/>
+                <a:tab pos="1346200" algn="l"/>
+                <a:tab pos="1795463" algn="l"/>
+                <a:tab pos="2244725" algn="l"/>
+                <a:tab pos="2693988" algn="l"/>
+                <a:tab pos="3143250" algn="l"/>
+                <a:tab pos="3592513" algn="l"/>
+                <a:tab pos="4041775" algn="l"/>
+                <a:tab pos="4491038" algn="l"/>
+                <a:tab pos="4940300" algn="l"/>
+                <a:tab pos="5389563" algn="l"/>
+                <a:tab pos="5838825" algn="l"/>
+                <a:tab pos="6288088" algn="l"/>
+                <a:tab pos="6737350" algn="l"/>
+                <a:tab pos="7186613" algn="l"/>
+                <a:tab pos="7635875" algn="l"/>
+                <a:tab pos="8085138" algn="l"/>
+                <a:tab pos="8534400" algn="l"/>
+                <a:tab pos="8983663" algn="l"/>
+                <a:tab pos="9410700" algn="l"/>
+                <a:tab pos="10134600" algn="l"/>
+              </a:tabLst>
+              <a:defRPr sz="2000">
+                <a:solidFill>
+                  <a:schemeClr val="bg1"/>
+                </a:solidFill>
+                <a:latin typeface="Arial" panose="020B0604020202020204" pitchFamily="34" charset="0"/>
+                <a:ea typeface="Microsoft YaHei" panose="020B0503020204020204" pitchFamily="34" charset="-122"/>
+              </a:defRPr>
+            </a:lvl4pPr>
+            <a:lvl5pPr>
+              <a:buClr>
+                <a:srgbClr val="000000"/>
+              </a:buClr>
+              <a:buSzPct val="100000"/>
+              <a:buFont typeface="Times New Roman" panose="02020603050405020304" pitchFamily="18" charset="0"/>
+              <a:tabLst>
+                <a:tab pos="0" algn="l"/>
+                <a:tab pos="447675" algn="l"/>
+                <a:tab pos="896938" algn="l"/>
+                <a:tab pos="1346200" algn="l"/>
+                <a:tab pos="1795463" algn="l"/>
+                <a:tab pos="2244725" algn="l"/>
+                <a:tab pos="2693988" algn="l"/>
+                <a:tab pos="3143250" algn="l"/>
+                <a:tab pos="3592513" algn="l"/>
+                <a:tab pos="4041775" algn="l"/>
+                <a:tab pos="4491038" algn="l"/>
+                <a:tab pos="4940300" algn="l"/>
+                <a:tab pos="5389563" algn="l"/>
+                <a:tab pos="5838825" algn="l"/>
+                <a:tab pos="6288088" algn="l"/>
+                <a:tab pos="6737350" algn="l"/>
+                <a:tab pos="7186613" algn="l"/>
+                <a:tab pos="7635875" algn="l"/>
+                <a:tab pos="8085138" algn="l"/>
+                <a:tab pos="8534400" algn="l"/>
+                <a:tab pos="8983663" algn="l"/>
+                <a:tab pos="9410700" algn="l"/>
+                <a:tab pos="10134600" algn="l"/>
+              </a:tabLst>
+              <a:defRPr sz="2000">
+                <a:solidFill>
+                  <a:schemeClr val="bg1"/>
+                </a:solidFill>
+                <a:latin typeface="Arial" panose="020B0604020202020204" pitchFamily="34" charset="0"/>
+                <a:ea typeface="Microsoft YaHei" panose="020B0503020204020204" pitchFamily="34" charset="-122"/>
+              </a:defRPr>
+            </a:lvl5pPr>
+            <a:lvl6pPr marL="2514600" indent="-228600" defTabSz="449263" eaLnBrk="0" fontAlgn="base" hangingPunct="0">
+              <a:spcBef>
+                <a:spcPct val="0"/>
+              </a:spcBef>
+              <a:spcAft>
+                <a:spcPct val="0"/>
+              </a:spcAft>
+              <a:buClr>
+                <a:srgbClr val="000000"/>
+              </a:buClr>
+              <a:buSzPct val="100000"/>
+              <a:buFont typeface="Times New Roman" panose="02020603050405020304" pitchFamily="18" charset="0"/>
+              <a:tabLst>
+                <a:tab pos="0" algn="l"/>
+                <a:tab pos="447675" algn="l"/>
+                <a:tab pos="896938" algn="l"/>
+                <a:tab pos="1346200" algn="l"/>
+                <a:tab pos="1795463" algn="l"/>
+                <a:tab pos="2244725" algn="l"/>
+                <a:tab pos="2693988" algn="l"/>
+                <a:tab pos="3143250" algn="l"/>
+                <a:tab pos="3592513" algn="l"/>
+                <a:tab pos="4041775" algn="l"/>
+                <a:tab pos="4491038" algn="l"/>
+                <a:tab pos="4940300" algn="l"/>
+                <a:tab pos="5389563" algn="l"/>
+                <a:tab pos="5838825" algn="l"/>
+                <a:tab pos="6288088" algn="l"/>
+                <a:tab pos="6737350" algn="l"/>
+                <a:tab pos="7186613" algn="l"/>
+                <a:tab pos="7635875" algn="l"/>
+                <a:tab pos="8085138" algn="l"/>
+                <a:tab pos="8534400" algn="l"/>
+                <a:tab pos="8983663" algn="l"/>
+                <a:tab pos="9410700" algn="l"/>
+                <a:tab pos="10134600" algn="l"/>
+              </a:tabLst>
+              <a:defRPr sz="2000">
+                <a:solidFill>
+                  <a:schemeClr val="bg1"/>
+                </a:solidFill>
+                <a:latin typeface="Arial" panose="020B0604020202020204" pitchFamily="34" charset="0"/>
+                <a:ea typeface="Microsoft YaHei" panose="020B0503020204020204" pitchFamily="34" charset="-122"/>
+              </a:defRPr>
+            </a:lvl6pPr>
+            <a:lvl7pPr marL="2971800" indent="-228600" defTabSz="449263" eaLnBrk="0" fontAlgn="base" hangingPunct="0">
+              <a:spcBef>
+                <a:spcPct val="0"/>
+              </a:spcBef>
+              <a:spcAft>
+                <a:spcPct val="0"/>
+              </a:spcAft>
+              <a:buClr>
+                <a:srgbClr val="000000"/>
+              </a:buClr>
+              <a:buSzPct val="100000"/>
+              <a:buFont typeface="Times New Roman" panose="02020603050405020304" pitchFamily="18" charset="0"/>
+              <a:tabLst>
+                <a:tab pos="0" algn="l"/>
+                <a:tab pos="447675" algn="l"/>
+                <a:tab pos="896938" algn="l"/>
+                <a:tab pos="1346200" algn="l"/>
+                <a:tab pos="1795463" algn="l"/>
+                <a:tab pos="2244725" algn="l"/>
+                <a:tab pos="2693988" algn="l"/>
+                <a:tab pos="3143250" algn="l"/>
+                <a:tab pos="3592513" algn="l"/>
+                <a:tab pos="4041775" algn="l"/>
+                <a:tab pos="4491038" algn="l"/>
+                <a:tab pos="4940300" algn="l"/>
+                <a:tab pos="5389563" algn="l"/>
+                <a:tab pos="5838825" algn="l"/>
+                <a:tab pos="6288088" algn="l"/>
+                <a:tab pos="6737350" algn="l"/>
+                <a:tab pos="7186613" algn="l"/>
+                <a:tab pos="7635875" algn="l"/>
+                <a:tab pos="8085138" algn="l"/>
+                <a:tab pos="8534400" algn="l"/>
+                <a:tab pos="8983663" algn="l"/>
+                <a:tab pos="9410700" algn="l"/>
+                <a:tab pos="10134600" algn="l"/>
+              </a:tabLst>
+              <a:defRPr sz="2000">
+                <a:solidFill>
+                  <a:schemeClr val="bg1"/>
+                </a:solidFill>
+                <a:latin typeface="Arial" panose="020B0604020202020204" pitchFamily="34" charset="0"/>
+                <a:ea typeface="Microsoft YaHei" panose="020B0503020204020204" pitchFamily="34" charset="-122"/>
+              </a:defRPr>
+            </a:lvl7pPr>
+            <a:lvl8pPr marL="3429000" indent="-228600" defTabSz="449263" eaLnBrk="0" fontAlgn="base" hangingPunct="0">
+              <a:spcBef>
+                <a:spcPct val="0"/>
+              </a:spcBef>
+              <a:spcAft>
+                <a:spcPct val="0"/>
+              </a:spcAft>
+              <a:buClr>
+                <a:srgbClr val="000000"/>
+              </a:buClr>
+              <a:buSzPct val="100000"/>
+              <a:buFont typeface="Times New Roman" panose="02020603050405020304" pitchFamily="18" charset="0"/>
+              <a:tabLst>
+                <a:tab pos="0" algn="l"/>
+                <a:tab pos="447675" algn="l"/>
+                <a:tab pos="896938" algn="l"/>
+                <a:tab pos="1346200" algn="l"/>
+                <a:tab pos="1795463" algn="l"/>
+                <a:tab pos="2244725" algn="l"/>
+                <a:tab pos="2693988" algn="l"/>
+                <a:tab pos="3143250" algn="l"/>
+                <a:tab pos="3592513" algn="l"/>
+                <a:tab pos="4041775" algn="l"/>
+                <a:tab pos="4491038" algn="l"/>
+                <a:tab pos="4940300" algn="l"/>
+                <a:tab pos="5389563" algn="l"/>
+                <a:tab pos="5838825" algn="l"/>
+                <a:tab pos="6288088" algn="l"/>
+                <a:tab pos="6737350" algn="l"/>
+                <a:tab pos="7186613" algn="l"/>
+                <a:tab pos="7635875" algn="l"/>
+                <a:tab pos="8085138" algn="l"/>
+                <a:tab pos="8534400" algn="l"/>
+                <a:tab pos="8983663" algn="l"/>
+                <a:tab pos="9410700" algn="l"/>
+                <a:tab pos="10134600" algn="l"/>
+              </a:tabLst>
+              <a:defRPr sz="2000">
+                <a:solidFill>
+                  <a:schemeClr val="bg1"/>
+                </a:solidFill>
+                <a:latin typeface="Arial" panose="020B0604020202020204" pitchFamily="34" charset="0"/>
+                <a:ea typeface="Microsoft YaHei" panose="020B0503020204020204" pitchFamily="34" charset="-122"/>
+              </a:defRPr>
+            </a:lvl8pPr>
+            <a:lvl9pPr marL="3886200" indent="-228600" defTabSz="449263" eaLnBrk="0" fontAlgn="base" hangingPunct="0">
+              <a:spcBef>
+                <a:spcPct val="0"/>
+              </a:spcBef>
+              <a:spcAft>
+                <a:spcPct val="0"/>
+              </a:spcAft>
+              <a:buClr>
+                <a:srgbClr val="000000"/>
+              </a:buClr>
+              <a:buSzPct val="100000"/>
+              <a:buFont typeface="Times New Roman" panose="02020603050405020304" pitchFamily="18" charset="0"/>
+              <a:tabLst>
+                <a:tab pos="0" algn="l"/>
+                <a:tab pos="447675" algn="l"/>
+                <a:tab pos="896938" algn="l"/>
+                <a:tab pos="1346200" algn="l"/>
+                <a:tab pos="1795463" algn="l"/>
+                <a:tab pos="2244725" algn="l"/>
+                <a:tab pos="2693988" algn="l"/>
+                <a:tab pos="3143250" algn="l"/>
+                <a:tab pos="3592513" algn="l"/>
+                <a:tab pos="4041775" algn="l"/>
+                <a:tab pos="4491038" algn="l"/>
+                <a:tab pos="4940300" algn="l"/>
+                <a:tab pos="5389563" algn="l"/>
+                <a:tab pos="5838825" algn="l"/>
+                <a:tab pos="6288088" algn="l"/>
+                <a:tab pos="6737350" algn="l"/>
+                <a:tab pos="7186613" algn="l"/>
+                <a:tab pos="7635875" algn="l"/>
+                <a:tab pos="8085138" algn="l"/>
+                <a:tab pos="8534400" algn="l"/>
+                <a:tab pos="8983663" algn="l"/>
+                <a:tab pos="9410700" algn="l"/>
+                <a:tab pos="10134600" algn="l"/>
+              </a:tabLst>
+              <a:defRPr sz="2000">
+                <a:solidFill>
+                  <a:schemeClr val="bg1"/>
+                </a:solidFill>
+                <a:latin typeface="Arial" panose="020B0604020202020204" pitchFamily="34" charset="0"/>
+                <a:ea typeface="Microsoft YaHei" panose="020B0503020204020204" pitchFamily="34" charset="-122"/>
+              </a:defRPr>
+            </a:lvl9pPr>
+          </a:lstStyle>
+          <a:p>
+            <a:pPr eaLnBrk="1" hangingPunct="1">
+              <a:buClrTx/>
+            </a:pPr>
+            <a:r>
+              <a:rPr lang="fr-CH" altLang="fr-FR" sz="4800" b="1" dirty="0">
+                <a:solidFill>
+                  <a:srgbClr val="000000"/>
+                </a:solidFill>
+              </a:rPr>
+              <a:t>Rôles de sécurité</a:t>
+            </a:r>
+          </a:p>
+        </p:txBody>
+      </p:sp>
+      <p:pic>
+        <p:nvPicPr>
+          <p:cNvPr id="3" name="Image 2">
+            <a:extLst>
+              <a:ext uri="{FF2B5EF4-FFF2-40B4-BE49-F238E27FC236}">
+                <a16:creationId xmlns:a16="http://schemas.microsoft.com/office/drawing/2014/main" id="{8910278A-12CA-4CB2-A6B7-E7EF946A9100}"/>
+              </a:ext>
+            </a:extLst>
+          </p:cNvPr>
+          <p:cNvPicPr>
+            <a:picLocks noChangeAspect="1"/>
+          </p:cNvPicPr>
+          <p:nvPr/>
+        </p:nvPicPr>
+        <p:blipFill>
+          <a:blip r:embed="rId2"/>
+          <a:stretch>
+            <a:fillRect/>
+          </a:stretch>
+        </p:blipFill>
+        <p:spPr>
+          <a:xfrm>
+            <a:off x="577255" y="1655911"/>
+            <a:ext cx="7838160" cy="1820986"/>
+          </a:xfrm>
+          <a:prstGeom prst="rect">
+            <a:avLst/>
+          </a:prstGeom>
+        </p:spPr>
+      </p:pic>
+      <p:pic>
+        <p:nvPicPr>
+          <p:cNvPr id="4" name="Image 3">
+            <a:extLst>
+              <a:ext uri="{FF2B5EF4-FFF2-40B4-BE49-F238E27FC236}">
+                <a16:creationId xmlns:a16="http://schemas.microsoft.com/office/drawing/2014/main" id="{136AA434-3D7B-4FB7-9C97-1C8980069DDB}"/>
+              </a:ext>
+            </a:extLst>
+          </p:cNvPr>
+          <p:cNvPicPr>
+            <a:picLocks noChangeAspect="1"/>
+          </p:cNvPicPr>
+          <p:nvPr/>
+        </p:nvPicPr>
+        <p:blipFill>
+          <a:blip r:embed="rId3"/>
+          <a:stretch>
+            <a:fillRect/>
+          </a:stretch>
+        </p:blipFill>
+        <p:spPr>
+          <a:xfrm>
+            <a:off x="2953519" y="3465063"/>
+            <a:ext cx="7672628" cy="2156734"/>
+          </a:xfrm>
+          <a:prstGeom prst="rect">
+            <a:avLst/>
+          </a:prstGeom>
+        </p:spPr>
+      </p:pic>
+    </p:spTree>
+    <p:extLst>
+      <p:ext uri="{BB962C8B-B14F-4D97-AF65-F5344CB8AC3E}">
+        <p14:creationId xmlns:p14="http://schemas.microsoft.com/office/powerpoint/2010/main" val="3284249853"/>
+      </p:ext>
+    </p:extLst>
+  </p:cSld>
+  <p:clrMapOvr>
+    <a:masterClrMapping/>
+  </p:clrMapOvr>
+  <mc:AlternateContent xmlns:mc="http://schemas.openxmlformats.org/markup-compatibility/2006">
+    <mc:Choice xmlns:p14="http://schemas.microsoft.com/office/powerpoint/2010/main" Requires="p14">
+      <p:transition spd="med" p14:dur="700">
+        <p:fade/>
+      </p:transition>
+    </mc:Choice>
+    <mc:Fallback>
+      <p:transition spd="med">
+        <p:fade/>
+      </p:transition>
+    </mc:Fallback>
+  </mc:AlternateContent>
+</p:sld>
+</file>
+
+<file path=ppt/slides/slide7.xml><?xml version="1.0" encoding="utf-8"?>
 <p:sld xmlns:a="http://schemas.openxmlformats.org/drawingml/2006/main" xmlns:r="http://schemas.openxmlformats.org/officeDocument/2006/relationships" xmlns:p="http://schemas.openxmlformats.org/presentationml/2006/main">
   <p:cSld>
     <p:spTree>

</xml_diff>